<commit_message>
Revised the algorithm data structures section
</commit_message>
<xml_diff>
--- a/paper/figures/figures.pptx
+++ b/paper/figures/figures.pptx
@@ -293,7 +293,7 @@
             <a:fld id="{4E7438E1-117D-44FB-AC24-B79D899BA877}" type="datetimeFigureOut">
               <a:rPr lang="he-IL" smtClean="0"/>
               <a:pPr/>
-              <a:t>כ"ט/טבת/תשע"ב</a:t>
+              <a:t>ב'/שבט/תשע"ב</a:t>
             </a:fld>
             <a:endParaRPr lang="he-IL"/>
           </a:p>
@@ -460,7 +460,7 @@
             <a:fld id="{4E7438E1-117D-44FB-AC24-B79D899BA877}" type="datetimeFigureOut">
               <a:rPr lang="he-IL" smtClean="0"/>
               <a:pPr/>
-              <a:t>כ"ט/טבת/תשע"ב</a:t>
+              <a:t>ב'/שבט/תשע"ב</a:t>
             </a:fld>
             <a:endParaRPr lang="he-IL"/>
           </a:p>
@@ -637,7 +637,7 @@
             <a:fld id="{4E7438E1-117D-44FB-AC24-B79D899BA877}" type="datetimeFigureOut">
               <a:rPr lang="he-IL" smtClean="0"/>
               <a:pPr/>
-              <a:t>כ"ט/טבת/תשע"ב</a:t>
+              <a:t>ב'/שבט/תשע"ב</a:t>
             </a:fld>
             <a:endParaRPr lang="he-IL"/>
           </a:p>
@@ -804,7 +804,7 @@
             <a:fld id="{4E7438E1-117D-44FB-AC24-B79D899BA877}" type="datetimeFigureOut">
               <a:rPr lang="he-IL" smtClean="0"/>
               <a:pPr/>
-              <a:t>כ"ט/טבת/תשע"ב</a:t>
+              <a:t>ב'/שבט/תשע"ב</a:t>
             </a:fld>
             <a:endParaRPr lang="he-IL"/>
           </a:p>
@@ -1047,7 +1047,7 @@
             <a:fld id="{4E7438E1-117D-44FB-AC24-B79D899BA877}" type="datetimeFigureOut">
               <a:rPr lang="he-IL" smtClean="0"/>
               <a:pPr/>
-              <a:t>כ"ט/טבת/תשע"ב</a:t>
+              <a:t>ב'/שבט/תשע"ב</a:t>
             </a:fld>
             <a:endParaRPr lang="he-IL"/>
           </a:p>
@@ -1332,7 +1332,7 @@
             <a:fld id="{4E7438E1-117D-44FB-AC24-B79D899BA877}" type="datetimeFigureOut">
               <a:rPr lang="he-IL" smtClean="0"/>
               <a:pPr/>
-              <a:t>כ"ט/טבת/תשע"ב</a:t>
+              <a:t>ב'/שבט/תשע"ב</a:t>
             </a:fld>
             <a:endParaRPr lang="he-IL"/>
           </a:p>
@@ -1751,7 +1751,7 @@
             <a:fld id="{4E7438E1-117D-44FB-AC24-B79D899BA877}" type="datetimeFigureOut">
               <a:rPr lang="he-IL" smtClean="0"/>
               <a:pPr/>
-              <a:t>כ"ט/טבת/תשע"ב</a:t>
+              <a:t>ב'/שבט/תשע"ב</a:t>
             </a:fld>
             <a:endParaRPr lang="he-IL"/>
           </a:p>
@@ -1866,7 +1866,7 @@
             <a:fld id="{4E7438E1-117D-44FB-AC24-B79D899BA877}" type="datetimeFigureOut">
               <a:rPr lang="he-IL" smtClean="0"/>
               <a:pPr/>
-              <a:t>כ"ט/טבת/תשע"ב</a:t>
+              <a:t>ב'/שבט/תשע"ב</a:t>
             </a:fld>
             <a:endParaRPr lang="he-IL"/>
           </a:p>
@@ -1958,7 +1958,7 @@
             <a:fld id="{4E7438E1-117D-44FB-AC24-B79D899BA877}" type="datetimeFigureOut">
               <a:rPr lang="he-IL" smtClean="0"/>
               <a:pPr/>
-              <a:t>כ"ט/טבת/תשע"ב</a:t>
+              <a:t>ב'/שבט/תשע"ב</a:t>
             </a:fld>
             <a:endParaRPr lang="he-IL"/>
           </a:p>
@@ -2232,7 +2232,7 @@
             <a:fld id="{4E7438E1-117D-44FB-AC24-B79D899BA877}" type="datetimeFigureOut">
               <a:rPr lang="he-IL" smtClean="0"/>
               <a:pPr/>
-              <a:t>כ"ט/טבת/תשע"ב</a:t>
+              <a:t>ב'/שבט/תשע"ב</a:t>
             </a:fld>
             <a:endParaRPr lang="he-IL"/>
           </a:p>
@@ -2482,7 +2482,7 @@
             <a:fld id="{4E7438E1-117D-44FB-AC24-B79D899BA877}" type="datetimeFigureOut">
               <a:rPr lang="he-IL" smtClean="0"/>
               <a:pPr/>
-              <a:t>כ"ט/טבת/תשע"ב</a:t>
+              <a:t>ב'/שבט/תשע"ב</a:t>
             </a:fld>
             <a:endParaRPr lang="he-IL"/>
           </a:p>
@@ -2692,7 +2692,7 @@
             <a:fld id="{4E7438E1-117D-44FB-AC24-B79D899BA877}" type="datetimeFigureOut">
               <a:rPr lang="he-IL" smtClean="0"/>
               <a:pPr/>
-              <a:t>כ"ט/טבת/תשע"ב</a:t>
+              <a:t>ב'/שבט/תשע"ב</a:t>
             </a:fld>
             <a:endParaRPr lang="he-IL"/>
           </a:p>
@@ -5033,15 +5033,7 @@
             <a:pPr algn="l" rtl="0"/>
             <a:r>
               <a:rPr lang="en-US" sz="1600" dirty="0" smtClean="0"/>
-              <a:t>Prod 2 </a:t>
-            </a:r>
-            <a:r>
-              <a:rPr lang="en-US" sz="1600" dirty="0" smtClean="0"/>
-              <a:t>access list</a:t>
-            </a:r>
-            <a:r>
-              <a:rPr lang="en-US" sz="1600" dirty="0" smtClean="0"/>
-              <a:t>: </a:t>
+              <a:t>Prod 2 access list: </a:t>
             </a:r>
           </a:p>
           <a:p>
@@ -5126,15 +5118,15 @@
             <a:pPr algn="l" rtl="0"/>
             <a:r>
               <a:rPr lang="en-US" sz="1600" dirty="0" smtClean="0"/>
-              <a:t>Cons 4 </a:t>
+              <a:t>Cons </a:t>
+            </a:r>
+            <a:r>
+              <a:rPr lang="en-US" sz="1600" smtClean="0"/>
+              <a:t>4 access </a:t>
             </a:r>
             <a:r>
               <a:rPr lang="en-US" sz="1600" dirty="0" smtClean="0"/>
-              <a:t>stealing list</a:t>
-            </a:r>
-            <a:r>
-              <a:rPr lang="en-US" sz="1600" dirty="0" smtClean="0"/>
-              <a:t>: </a:t>
+              <a:t>list: </a:t>
             </a:r>
           </a:p>
           <a:p>
@@ -5265,7 +5257,7 @@
         </p:nvSpPr>
         <p:spPr>
           <a:xfrm>
-            <a:off x="4499992" y="2348880"/>
+            <a:off x="3203848" y="2348880"/>
             <a:ext cx="864096" cy="1296144"/>
           </a:xfrm>
           <a:prstGeom prst="rect">
@@ -5307,7 +5299,7 @@
         </p:nvCxnSpPr>
         <p:spPr>
           <a:xfrm>
-            <a:off x="4499992" y="2780928"/>
+            <a:off x="3203848" y="2780928"/>
             <a:ext cx="864096" cy="0"/>
           </a:xfrm>
           <a:prstGeom prst="line">
@@ -5337,7 +5329,7 @@
         </p:nvSpPr>
         <p:spPr>
           <a:xfrm>
-            <a:off x="4499992" y="2348880"/>
+            <a:off x="3203848" y="2348880"/>
             <a:ext cx="864096" cy="216024"/>
           </a:xfrm>
           <a:prstGeom prst="rect">
@@ -5381,7 +5373,7 @@
         </p:nvCxnSpPr>
         <p:spPr>
           <a:xfrm>
-            <a:off x="4499992" y="2996952"/>
+            <a:off x="3203848" y="2996952"/>
             <a:ext cx="864096" cy="0"/>
           </a:xfrm>
           <a:prstGeom prst="line">
@@ -5411,7 +5403,7 @@
         </p:nvCxnSpPr>
         <p:spPr>
           <a:xfrm>
-            <a:off x="4499992" y="3212976"/>
+            <a:off x="3203848" y="3212976"/>
             <a:ext cx="864096" cy="0"/>
           </a:xfrm>
           <a:prstGeom prst="line">
@@ -5441,7 +5433,7 @@
         </p:nvCxnSpPr>
         <p:spPr>
           <a:xfrm>
-            <a:off x="4499992" y="3429000"/>
+            <a:off x="3203848" y="3429000"/>
             <a:ext cx="864096" cy="0"/>
           </a:xfrm>
           <a:prstGeom prst="line">
@@ -5471,7 +5463,7 @@
         </p:nvSpPr>
         <p:spPr>
           <a:xfrm>
-            <a:off x="4499992" y="2564905"/>
+            <a:off x="3203848" y="2564905"/>
             <a:ext cx="864096" cy="307777"/>
           </a:xfrm>
           <a:prstGeom prst="rect">
@@ -5502,7 +5494,7 @@
         </p:nvSpPr>
         <p:spPr>
           <a:xfrm>
-            <a:off x="4499992" y="2780928"/>
+            <a:off x="3203848" y="2780928"/>
             <a:ext cx="864096" cy="307777"/>
           </a:xfrm>
           <a:prstGeom prst="rect">
@@ -5533,7 +5525,7 @@
         </p:nvSpPr>
         <p:spPr>
           <a:xfrm>
-            <a:off x="4499992" y="2996952"/>
+            <a:off x="3203848" y="2996952"/>
             <a:ext cx="864096" cy="307777"/>
           </a:xfrm>
           <a:prstGeom prst="rect">
@@ -5564,7 +5556,7 @@
         </p:nvSpPr>
         <p:spPr>
           <a:xfrm>
-            <a:off x="4499992" y="3212976"/>
+            <a:off x="3203848" y="3212976"/>
             <a:ext cx="864096" cy="307777"/>
           </a:xfrm>
           <a:prstGeom prst="rect">
@@ -5595,7 +5587,7 @@
         </p:nvSpPr>
         <p:spPr>
           <a:xfrm>
-            <a:off x="4499992" y="3429000"/>
+            <a:off x="3203848" y="3429000"/>
             <a:ext cx="864096" cy="307777"/>
           </a:xfrm>
           <a:prstGeom prst="rect">
@@ -5626,7 +5618,7 @@
         </p:nvSpPr>
         <p:spPr>
           <a:xfrm>
-            <a:off x="5940152" y="2348880"/>
+            <a:off x="4644008" y="2348880"/>
             <a:ext cx="864096" cy="1296144"/>
           </a:xfrm>
           <a:prstGeom prst="rect">
@@ -5668,7 +5660,7 @@
         </p:nvCxnSpPr>
         <p:spPr>
           <a:xfrm>
-            <a:off x="5940152" y="2780928"/>
+            <a:off x="4644008" y="2780928"/>
             <a:ext cx="864096" cy="0"/>
           </a:xfrm>
           <a:prstGeom prst="line">
@@ -5698,7 +5690,7 @@
         </p:nvSpPr>
         <p:spPr>
           <a:xfrm>
-            <a:off x="5940152" y="2348880"/>
+            <a:off x="4644008" y="2348880"/>
             <a:ext cx="864096" cy="216024"/>
           </a:xfrm>
           <a:prstGeom prst="rect">
@@ -5742,7 +5734,7 @@
         </p:nvCxnSpPr>
         <p:spPr>
           <a:xfrm>
-            <a:off x="5940152" y="2996952"/>
+            <a:off x="4644008" y="2996952"/>
             <a:ext cx="864096" cy="0"/>
           </a:xfrm>
           <a:prstGeom prst="line">
@@ -5772,7 +5764,7 @@
         </p:nvCxnSpPr>
         <p:spPr>
           <a:xfrm>
-            <a:off x="5940152" y="3212976"/>
+            <a:off x="4644008" y="3212976"/>
             <a:ext cx="864096" cy="0"/>
           </a:xfrm>
           <a:prstGeom prst="line">
@@ -5802,7 +5794,7 @@
         </p:nvCxnSpPr>
         <p:spPr>
           <a:xfrm>
-            <a:off x="5940152" y="3429000"/>
+            <a:off x="4644008" y="3429000"/>
             <a:ext cx="864096" cy="0"/>
           </a:xfrm>
           <a:prstGeom prst="line">
@@ -5832,7 +5824,7 @@
         </p:nvSpPr>
         <p:spPr>
           <a:xfrm>
-            <a:off x="5940152" y="2564905"/>
+            <a:off x="4644008" y="2564905"/>
             <a:ext cx="864096" cy="307777"/>
           </a:xfrm>
           <a:prstGeom prst="rect">
@@ -5863,7 +5855,7 @@
         </p:nvSpPr>
         <p:spPr>
           <a:xfrm>
-            <a:off x="5940152" y="2780928"/>
+            <a:off x="4644008" y="2780928"/>
             <a:ext cx="864096" cy="307777"/>
           </a:xfrm>
           <a:prstGeom prst="rect">
@@ -5894,7 +5886,7 @@
         </p:nvSpPr>
         <p:spPr>
           <a:xfrm>
-            <a:off x="5940152" y="2996952"/>
+            <a:off x="4644008" y="2996952"/>
             <a:ext cx="864096" cy="338554"/>
           </a:xfrm>
           <a:prstGeom prst="rect">
@@ -5928,7 +5920,7 @@
         </p:nvSpPr>
         <p:spPr>
           <a:xfrm>
-            <a:off x="5940152" y="3212976"/>
+            <a:off x="4644008" y="3212976"/>
             <a:ext cx="864096" cy="307777"/>
           </a:xfrm>
           <a:prstGeom prst="rect">
@@ -5962,7 +5954,7 @@
         </p:nvSpPr>
         <p:spPr>
           <a:xfrm>
-            <a:off x="5940152" y="3429000"/>
+            <a:off x="4644008" y="3429000"/>
             <a:ext cx="864096" cy="307777"/>
           </a:xfrm>
           <a:prstGeom prst="rect">
@@ -5996,7 +5988,7 @@
         </p:nvSpPr>
         <p:spPr>
           <a:xfrm>
-            <a:off x="4572000" y="1700808"/>
+            <a:off x="3275856" y="1700808"/>
             <a:ext cx="720080" cy="288032"/>
           </a:xfrm>
           <a:prstGeom prst="roundRect">
@@ -6038,7 +6030,7 @@
         </p:nvSpPr>
         <p:spPr>
           <a:xfrm>
-            <a:off x="4644008" y="1700808"/>
+            <a:off x="3347864" y="1700808"/>
             <a:ext cx="580608" cy="307777"/>
           </a:xfrm>
           <a:prstGeom prst="rect">
@@ -6076,7 +6068,7 @@
         </p:nvCxnSpPr>
         <p:spPr>
           <a:xfrm flipH="1">
-            <a:off x="4932040" y="2008585"/>
+            <a:off x="3635896" y="2008585"/>
             <a:ext cx="2272" cy="340295"/>
           </a:xfrm>
           <a:prstGeom prst="straightConnector1">
@@ -6109,7 +6101,7 @@
         </p:nvSpPr>
         <p:spPr>
           <a:xfrm>
-            <a:off x="6012160" y="1700808"/>
+            <a:off x="4716016" y="1700808"/>
             <a:ext cx="720080" cy="288032"/>
           </a:xfrm>
           <a:prstGeom prst="roundRect">
@@ -6151,7 +6143,7 @@
         </p:nvSpPr>
         <p:spPr>
           <a:xfrm>
-            <a:off x="6012160" y="1700808"/>
+            <a:off x="4716016" y="1700808"/>
             <a:ext cx="720080" cy="307777"/>
           </a:xfrm>
           <a:prstGeom prst="rect">
@@ -6189,7 +6181,7 @@
         </p:nvCxnSpPr>
         <p:spPr>
           <a:xfrm>
-            <a:off x="6372200" y="2008585"/>
+            <a:off x="5076056" y="2008585"/>
             <a:ext cx="0" cy="340295"/>
           </a:xfrm>
           <a:prstGeom prst="straightConnector1">
@@ -6222,7 +6214,7 @@
         </p:nvSpPr>
         <p:spPr>
           <a:xfrm>
-            <a:off x="3168352" y="1700808"/>
+            <a:off x="1872208" y="1700808"/>
             <a:ext cx="720080" cy="288032"/>
           </a:xfrm>
           <a:prstGeom prst="roundRect">
@@ -6264,7 +6256,7 @@
         </p:nvSpPr>
         <p:spPr>
           <a:xfrm>
-            <a:off x="3240360" y="1700808"/>
+            <a:off x="1944216" y="1700808"/>
             <a:ext cx="580608" cy="307777"/>
           </a:xfrm>
           <a:prstGeom prst="rect">
@@ -6299,7 +6291,7 @@
         </p:nvCxnSpPr>
         <p:spPr>
           <a:xfrm>
-            <a:off x="3563888" y="1988840"/>
+            <a:off x="2267744" y="1988840"/>
             <a:ext cx="0" cy="288032"/>
           </a:xfrm>
           <a:prstGeom prst="line">
@@ -6330,7 +6322,7 @@
         </p:nvCxnSpPr>
         <p:spPr>
           <a:xfrm flipH="1">
-            <a:off x="3347864" y="2276872"/>
+            <a:off x="2051720" y="2276872"/>
             <a:ext cx="432048" cy="0"/>
           </a:xfrm>
           <a:prstGeom prst="line">
@@ -6361,7 +6353,7 @@
         </p:nvCxnSpPr>
         <p:spPr>
           <a:xfrm flipH="1">
-            <a:off x="3419872" y="2348880"/>
+            <a:off x="2123728" y="2348880"/>
             <a:ext cx="288032" cy="0"/>
           </a:xfrm>
           <a:prstGeom prst="line">
@@ -6395,7 +6387,7 @@
         </p:nvCxnSpPr>
         <p:spPr>
           <a:xfrm>
-            <a:off x="3888432" y="1844824"/>
+            <a:off x="2592288" y="1844824"/>
             <a:ext cx="683568" cy="0"/>
           </a:xfrm>
           <a:prstGeom prst="straightConnector1">
@@ -6430,7 +6422,7 @@
         </p:nvCxnSpPr>
         <p:spPr>
           <a:xfrm>
-            <a:off x="5292080" y="1844824"/>
+            <a:off x="3995936" y="1844824"/>
             <a:ext cx="720080" cy="9873"/>
           </a:xfrm>
           <a:prstGeom prst="straightConnector1">
@@ -6463,7 +6455,7 @@
         </p:nvSpPr>
         <p:spPr>
           <a:xfrm>
-            <a:off x="1907704" y="1628800"/>
+            <a:off x="611560" y="1628800"/>
             <a:ext cx="576064" cy="2592288"/>
           </a:xfrm>
           <a:prstGeom prst="rect">
@@ -6509,7 +6501,7 @@
         </p:nvCxnSpPr>
         <p:spPr>
           <a:xfrm>
-            <a:off x="7020272" y="1844824"/>
+            <a:off x="5724128" y="1844824"/>
             <a:ext cx="0" cy="144016"/>
           </a:xfrm>
           <a:prstGeom prst="line">
@@ -6540,7 +6532,7 @@
         </p:nvCxnSpPr>
         <p:spPr>
           <a:xfrm flipH="1">
-            <a:off x="6804248" y="1988840"/>
+            <a:off x="5508104" y="1988840"/>
             <a:ext cx="432048" cy="0"/>
           </a:xfrm>
           <a:prstGeom prst="line">
@@ -6571,7 +6563,7 @@
         </p:nvCxnSpPr>
         <p:spPr>
           <a:xfrm flipH="1">
-            <a:off x="6876256" y="2060848"/>
+            <a:off x="5580112" y="2060848"/>
             <a:ext cx="288032" cy="0"/>
           </a:xfrm>
           <a:prstGeom prst="line">
@@ -6602,7 +6594,7 @@
         </p:nvCxnSpPr>
         <p:spPr>
           <a:xfrm flipH="1">
-            <a:off x="6732240" y="1844824"/>
+            <a:off x="5436096" y="1844824"/>
             <a:ext cx="288032" cy="0"/>
           </a:xfrm>
           <a:prstGeom prst="line">
@@ -6633,7 +6625,7 @@
         </p:nvSpPr>
         <p:spPr>
           <a:xfrm>
-            <a:off x="3059832" y="3429000"/>
+            <a:off x="1763688" y="3429000"/>
             <a:ext cx="864096" cy="1296144"/>
           </a:xfrm>
           <a:prstGeom prst="rect">
@@ -6675,7 +6667,7 @@
         </p:nvCxnSpPr>
         <p:spPr>
           <a:xfrm>
-            <a:off x="3059832" y="3861048"/>
+            <a:off x="1763688" y="3861048"/>
             <a:ext cx="864096" cy="0"/>
           </a:xfrm>
           <a:prstGeom prst="line">
@@ -6705,7 +6697,7 @@
         </p:nvSpPr>
         <p:spPr>
           <a:xfrm>
-            <a:off x="3059832" y="3429000"/>
+            <a:off x="1763688" y="3429000"/>
             <a:ext cx="864096" cy="216024"/>
           </a:xfrm>
           <a:prstGeom prst="rect">
@@ -6749,7 +6741,7 @@
         </p:nvCxnSpPr>
         <p:spPr>
           <a:xfrm>
-            <a:off x="3059832" y="4077072"/>
+            <a:off x="1763688" y="4077072"/>
             <a:ext cx="864096" cy="0"/>
           </a:xfrm>
           <a:prstGeom prst="line">
@@ -6779,7 +6771,7 @@
         </p:nvCxnSpPr>
         <p:spPr>
           <a:xfrm>
-            <a:off x="3059832" y="4293096"/>
+            <a:off x="1763688" y="4293096"/>
             <a:ext cx="864096" cy="0"/>
           </a:xfrm>
           <a:prstGeom prst="line">
@@ -6809,7 +6801,7 @@
         </p:nvCxnSpPr>
         <p:spPr>
           <a:xfrm>
-            <a:off x="3059832" y="4509120"/>
+            <a:off x="1763688" y="4509120"/>
             <a:ext cx="864096" cy="0"/>
           </a:xfrm>
           <a:prstGeom prst="line">
@@ -6839,7 +6831,7 @@
         </p:nvSpPr>
         <p:spPr>
           <a:xfrm>
-            <a:off x="3059832" y="3645025"/>
+            <a:off x="1763688" y="3645025"/>
             <a:ext cx="864096" cy="307777"/>
           </a:xfrm>
           <a:prstGeom prst="rect">
@@ -6870,7 +6862,7 @@
         </p:nvSpPr>
         <p:spPr>
           <a:xfrm>
-            <a:off x="3059832" y="3861048"/>
+            <a:off x="1763688" y="3861048"/>
             <a:ext cx="864096" cy="307777"/>
           </a:xfrm>
           <a:prstGeom prst="rect">
@@ -6901,7 +6893,7 @@
         </p:nvSpPr>
         <p:spPr>
           <a:xfrm>
-            <a:off x="3059832" y="4077072"/>
+            <a:off x="1763688" y="4077072"/>
             <a:ext cx="864096" cy="307777"/>
           </a:xfrm>
           <a:prstGeom prst="rect">
@@ -6932,7 +6924,7 @@
         </p:nvSpPr>
         <p:spPr>
           <a:xfrm>
-            <a:off x="3059832" y="4293096"/>
+            <a:off x="1763688" y="4293096"/>
             <a:ext cx="864096" cy="307777"/>
           </a:xfrm>
           <a:prstGeom prst="rect">
@@ -6966,7 +6958,7 @@
         </p:nvSpPr>
         <p:spPr>
           <a:xfrm>
-            <a:off x="3059832" y="4509120"/>
+            <a:off x="1763688" y="4509120"/>
             <a:ext cx="864096" cy="307777"/>
           </a:xfrm>
           <a:prstGeom prst="rect">
@@ -7000,7 +6992,7 @@
         </p:nvSpPr>
         <p:spPr>
           <a:xfrm>
-            <a:off x="3131840" y="2780928"/>
+            <a:off x="1835696" y="2780928"/>
             <a:ext cx="720080" cy="288032"/>
           </a:xfrm>
           <a:prstGeom prst="roundRect">
@@ -7042,7 +7034,7 @@
         </p:nvSpPr>
         <p:spPr>
           <a:xfrm>
-            <a:off x="3203848" y="2780928"/>
+            <a:off x="1907704" y="2780928"/>
             <a:ext cx="580608" cy="307777"/>
           </a:xfrm>
           <a:prstGeom prst="rect">
@@ -7080,7 +7072,7 @@
         </p:nvCxnSpPr>
         <p:spPr>
           <a:xfrm flipH="1">
-            <a:off x="3491880" y="3088705"/>
+            <a:off x="2195736" y="3088705"/>
             <a:ext cx="2272" cy="340295"/>
           </a:xfrm>
           <a:prstGeom prst="straightConnector1">
@@ -7115,7 +7107,7 @@
         </p:nvCxnSpPr>
         <p:spPr>
           <a:xfrm>
-            <a:off x="2483768" y="1844824"/>
+            <a:off x="1187624" y="1844824"/>
             <a:ext cx="684584" cy="0"/>
           </a:xfrm>
           <a:prstGeom prst="straightConnector1">
@@ -7150,7 +7142,7 @@
         </p:nvCxnSpPr>
         <p:spPr>
           <a:xfrm>
-            <a:off x="2483768" y="2924944"/>
+            <a:off x="1187624" y="2924944"/>
             <a:ext cx="648072" cy="0"/>
           </a:xfrm>
           <a:prstGeom prst="straightConnector1">
@@ -7183,7 +7175,7 @@
         </p:nvCxnSpPr>
         <p:spPr>
           <a:xfrm>
-            <a:off x="4067944" y="2924944"/>
+            <a:off x="2771800" y="2924944"/>
             <a:ext cx="0" cy="144016"/>
           </a:xfrm>
           <a:prstGeom prst="line">
@@ -7214,7 +7206,7 @@
         </p:nvCxnSpPr>
         <p:spPr>
           <a:xfrm flipH="1">
-            <a:off x="3851920" y="3068960"/>
+            <a:off x="2555776" y="3068960"/>
             <a:ext cx="432048" cy="0"/>
           </a:xfrm>
           <a:prstGeom prst="line">
@@ -7245,7 +7237,7 @@
         </p:nvCxnSpPr>
         <p:spPr>
           <a:xfrm flipH="1">
-            <a:off x="3923928" y="3140968"/>
+            <a:off x="2627784" y="3140968"/>
             <a:ext cx="288032" cy="0"/>
           </a:xfrm>
           <a:prstGeom prst="line">
@@ -7276,7 +7268,7 @@
         </p:nvCxnSpPr>
         <p:spPr>
           <a:xfrm flipH="1">
-            <a:off x="3851920" y="2924944"/>
+            <a:off x="2555776" y="2924944"/>
             <a:ext cx="216024" cy="0"/>
           </a:xfrm>
           <a:prstGeom prst="line">
@@ -7307,7 +7299,7 @@
         </p:nvSpPr>
         <p:spPr>
           <a:xfrm>
-            <a:off x="1907704" y="1700808"/>
+            <a:off x="611560" y="1700808"/>
             <a:ext cx="619400" cy="307777"/>
           </a:xfrm>
           <a:prstGeom prst="rect">
@@ -7338,7 +7330,7 @@
         </p:nvCxnSpPr>
         <p:spPr>
           <a:xfrm flipH="1">
-            <a:off x="1907704" y="2060848"/>
+            <a:off x="611560" y="2060848"/>
             <a:ext cx="576064" cy="0"/>
           </a:xfrm>
           <a:prstGeom prst="line">
@@ -7369,7 +7361,7 @@
         </p:nvSpPr>
         <p:spPr>
           <a:xfrm>
-            <a:off x="1907704" y="2060848"/>
+            <a:off x="611560" y="2060848"/>
             <a:ext cx="619400" cy="307777"/>
           </a:xfrm>
           <a:prstGeom prst="rect">
@@ -7400,7 +7392,7 @@
         </p:nvCxnSpPr>
         <p:spPr>
           <a:xfrm flipH="1">
-            <a:off x="1907704" y="2420888"/>
+            <a:off x="611560" y="2420888"/>
             <a:ext cx="576064" cy="0"/>
           </a:xfrm>
           <a:prstGeom prst="line">
@@ -7431,7 +7423,7 @@
         </p:nvSpPr>
         <p:spPr>
           <a:xfrm>
-            <a:off x="1907704" y="2420888"/>
+            <a:off x="611560" y="2420888"/>
             <a:ext cx="619400" cy="307777"/>
           </a:xfrm>
           <a:prstGeom prst="rect">
@@ -7462,7 +7454,7 @@
         </p:nvCxnSpPr>
         <p:spPr>
           <a:xfrm flipH="1">
-            <a:off x="1907704" y="2780928"/>
+            <a:off x="611560" y="2780928"/>
             <a:ext cx="576064" cy="0"/>
           </a:xfrm>
           <a:prstGeom prst="line">
@@ -7493,7 +7485,7 @@
         </p:nvSpPr>
         <p:spPr>
           <a:xfrm>
-            <a:off x="1907704" y="2780928"/>
+            <a:off x="611560" y="2780928"/>
             <a:ext cx="619400" cy="307777"/>
           </a:xfrm>
           <a:prstGeom prst="rect">
@@ -7524,7 +7516,7 @@
         </p:nvCxnSpPr>
         <p:spPr>
           <a:xfrm flipH="1">
-            <a:off x="1907704" y="3140968"/>
+            <a:off x="611560" y="3140968"/>
             <a:ext cx="576064" cy="0"/>
           </a:xfrm>
           <a:prstGeom prst="line">
@@ -7555,7 +7547,7 @@
         </p:nvSpPr>
         <p:spPr>
           <a:xfrm>
-            <a:off x="1907704" y="3140968"/>
+            <a:off x="611560" y="3140968"/>
             <a:ext cx="619400" cy="307777"/>
           </a:xfrm>
           <a:prstGeom prst="rect">
@@ -7586,7 +7578,7 @@
         </p:nvCxnSpPr>
         <p:spPr>
           <a:xfrm flipH="1">
-            <a:off x="1907704" y="3501008"/>
+            <a:off x="611560" y="3501008"/>
             <a:ext cx="576064" cy="0"/>
           </a:xfrm>
           <a:prstGeom prst="line">
@@ -7617,7 +7609,7 @@
         </p:nvSpPr>
         <p:spPr>
           <a:xfrm>
-            <a:off x="1907704" y="3501008"/>
+            <a:off x="611560" y="3501008"/>
             <a:ext cx="619400" cy="307777"/>
           </a:xfrm>
           <a:prstGeom prst="rect">
@@ -7648,7 +7640,7 @@
         </p:nvCxnSpPr>
         <p:spPr>
           <a:xfrm flipH="1">
-            <a:off x="1907704" y="3861048"/>
+            <a:off x="611560" y="3861048"/>
             <a:ext cx="576064" cy="0"/>
           </a:xfrm>
           <a:prstGeom prst="line">
@@ -7679,7 +7671,7 @@
         </p:nvSpPr>
         <p:spPr>
           <a:xfrm>
-            <a:off x="1952300" y="3861048"/>
+            <a:off x="656156" y="3861048"/>
             <a:ext cx="530210" cy="307777"/>
           </a:xfrm>
           <a:prstGeom prst="rect">
@@ -7696,11 +7688,965 @@
             <a:pPr algn="ctr" rtl="0"/>
             <a:r>
               <a:rPr lang="en-US" sz="1400" dirty="0" smtClean="0"/>
-              <a:t>stea</a:t>
-            </a:r>
+              <a:t>steal</a:t>
+            </a:r>
+            <a:endParaRPr lang="en-US" dirty="0"/>
+          </a:p>
+        </p:txBody>
+      </p:sp>
+      <p:cxnSp>
+        <p:nvCxnSpPr>
+          <p:cNvPr id="115" name="Straight Connector 114"/>
+          <p:cNvCxnSpPr/>
+          <p:nvPr/>
+        </p:nvCxnSpPr>
+        <p:spPr>
+          <a:xfrm flipH="1">
+            <a:off x="611560" y="4221088"/>
+            <a:ext cx="576064" cy="0"/>
+          </a:xfrm>
+          <a:prstGeom prst="line">
+            <a:avLst/>
+          </a:prstGeom>
+          <a:ln w="12700"/>
+        </p:spPr>
+        <p:style>
+          <a:lnRef idx="1">
+            <a:schemeClr val="dk1"/>
+          </a:lnRef>
+          <a:fillRef idx="0">
+            <a:schemeClr val="dk1"/>
+          </a:fillRef>
+          <a:effectRef idx="0">
+            <a:schemeClr val="dk1"/>
+          </a:effectRef>
+          <a:fontRef idx="minor">
+            <a:schemeClr val="tx1"/>
+          </a:fontRef>
+        </p:style>
+      </p:cxnSp>
+      <p:cxnSp>
+        <p:nvCxnSpPr>
+          <p:cNvPr id="116" name="Straight Connector 115"/>
+          <p:cNvCxnSpPr/>
+          <p:nvPr/>
+        </p:nvCxnSpPr>
+        <p:spPr>
+          <a:xfrm>
+            <a:off x="1403648" y="2204864"/>
+            <a:ext cx="0" cy="144016"/>
+          </a:xfrm>
+          <a:prstGeom prst="line">
+            <a:avLst/>
+          </a:prstGeom>
+          <a:ln w="12700"/>
+        </p:spPr>
+        <p:style>
+          <a:lnRef idx="1">
+            <a:schemeClr val="dk1"/>
+          </a:lnRef>
+          <a:fillRef idx="0">
+            <a:schemeClr val="dk1"/>
+          </a:fillRef>
+          <a:effectRef idx="0">
+            <a:schemeClr val="dk1"/>
+          </a:effectRef>
+          <a:fontRef idx="minor">
+            <a:schemeClr val="tx1"/>
+          </a:fontRef>
+        </p:style>
+      </p:cxnSp>
+      <p:cxnSp>
+        <p:nvCxnSpPr>
+          <p:cNvPr id="117" name="Straight Connector 116"/>
+          <p:cNvCxnSpPr/>
+          <p:nvPr/>
+        </p:nvCxnSpPr>
+        <p:spPr>
+          <a:xfrm flipH="1">
+            <a:off x="1187624" y="2348880"/>
+            <a:ext cx="432048" cy="0"/>
+          </a:xfrm>
+          <a:prstGeom prst="line">
+            <a:avLst/>
+          </a:prstGeom>
+          <a:ln w="12700"/>
+        </p:spPr>
+        <p:style>
+          <a:lnRef idx="1">
+            <a:schemeClr val="dk1"/>
+          </a:lnRef>
+          <a:fillRef idx="0">
+            <a:schemeClr val="dk1"/>
+          </a:fillRef>
+          <a:effectRef idx="0">
+            <a:schemeClr val="dk1"/>
+          </a:effectRef>
+          <a:fontRef idx="minor">
+            <a:schemeClr val="tx1"/>
+          </a:fontRef>
+        </p:style>
+      </p:cxnSp>
+      <p:cxnSp>
+        <p:nvCxnSpPr>
+          <p:cNvPr id="118" name="Straight Connector 117"/>
+          <p:cNvCxnSpPr/>
+          <p:nvPr/>
+        </p:nvCxnSpPr>
+        <p:spPr>
+          <a:xfrm flipH="1">
+            <a:off x="1259632" y="2420888"/>
+            <a:ext cx="288032" cy="0"/>
+          </a:xfrm>
+          <a:prstGeom prst="line">
+            <a:avLst/>
+          </a:prstGeom>
+          <a:ln w="12700"/>
+        </p:spPr>
+        <p:style>
+          <a:lnRef idx="1">
+            <a:schemeClr val="dk1"/>
+          </a:lnRef>
+          <a:fillRef idx="0">
+            <a:schemeClr val="dk1"/>
+          </a:fillRef>
+          <a:effectRef idx="0">
+            <a:schemeClr val="dk1"/>
+          </a:effectRef>
+          <a:fontRef idx="minor">
+            <a:schemeClr val="tx1"/>
+          </a:fontRef>
+        </p:style>
+      </p:cxnSp>
+      <p:cxnSp>
+        <p:nvCxnSpPr>
+          <p:cNvPr id="119" name="Straight Connector 118"/>
+          <p:cNvCxnSpPr/>
+          <p:nvPr/>
+        </p:nvCxnSpPr>
+        <p:spPr>
+          <a:xfrm flipH="1">
+            <a:off x="1187624" y="2204864"/>
+            <a:ext cx="216024" cy="0"/>
+          </a:xfrm>
+          <a:prstGeom prst="line">
+            <a:avLst/>
+          </a:prstGeom>
+          <a:ln w="12700"/>
+        </p:spPr>
+        <p:style>
+          <a:lnRef idx="1">
+            <a:schemeClr val="dk1"/>
+          </a:lnRef>
+          <a:fillRef idx="0">
+            <a:schemeClr val="dk1"/>
+          </a:fillRef>
+          <a:effectRef idx="0">
+            <a:schemeClr val="dk1"/>
+          </a:effectRef>
+          <a:fontRef idx="minor">
+            <a:schemeClr val="tx1"/>
+          </a:fontRef>
+        </p:style>
+      </p:cxnSp>
+      <p:cxnSp>
+        <p:nvCxnSpPr>
+          <p:cNvPr id="120" name="Straight Connector 119"/>
+          <p:cNvCxnSpPr/>
+          <p:nvPr/>
+        </p:nvCxnSpPr>
+        <p:spPr>
+          <a:xfrm>
+            <a:off x="1403648" y="2564904"/>
+            <a:ext cx="0" cy="144016"/>
+          </a:xfrm>
+          <a:prstGeom prst="line">
+            <a:avLst/>
+          </a:prstGeom>
+          <a:ln w="12700"/>
+        </p:spPr>
+        <p:style>
+          <a:lnRef idx="1">
+            <a:schemeClr val="dk1"/>
+          </a:lnRef>
+          <a:fillRef idx="0">
+            <a:schemeClr val="dk1"/>
+          </a:fillRef>
+          <a:effectRef idx="0">
+            <a:schemeClr val="dk1"/>
+          </a:effectRef>
+          <a:fontRef idx="minor">
+            <a:schemeClr val="tx1"/>
+          </a:fontRef>
+        </p:style>
+      </p:cxnSp>
+      <p:cxnSp>
+        <p:nvCxnSpPr>
+          <p:cNvPr id="121" name="Straight Connector 120"/>
+          <p:cNvCxnSpPr/>
+          <p:nvPr/>
+        </p:nvCxnSpPr>
+        <p:spPr>
+          <a:xfrm flipH="1">
+            <a:off x="1187624" y="2708920"/>
+            <a:ext cx="432048" cy="0"/>
+          </a:xfrm>
+          <a:prstGeom prst="line">
+            <a:avLst/>
+          </a:prstGeom>
+          <a:ln w="12700"/>
+        </p:spPr>
+        <p:style>
+          <a:lnRef idx="1">
+            <a:schemeClr val="dk1"/>
+          </a:lnRef>
+          <a:fillRef idx="0">
+            <a:schemeClr val="dk1"/>
+          </a:fillRef>
+          <a:effectRef idx="0">
+            <a:schemeClr val="dk1"/>
+          </a:effectRef>
+          <a:fontRef idx="minor">
+            <a:schemeClr val="tx1"/>
+          </a:fontRef>
+        </p:style>
+      </p:cxnSp>
+      <p:cxnSp>
+        <p:nvCxnSpPr>
+          <p:cNvPr id="122" name="Straight Connector 121"/>
+          <p:cNvCxnSpPr/>
+          <p:nvPr/>
+        </p:nvCxnSpPr>
+        <p:spPr>
+          <a:xfrm flipH="1">
+            <a:off x="1259632" y="2780928"/>
+            <a:ext cx="288032" cy="0"/>
+          </a:xfrm>
+          <a:prstGeom prst="line">
+            <a:avLst/>
+          </a:prstGeom>
+          <a:ln w="12700"/>
+        </p:spPr>
+        <p:style>
+          <a:lnRef idx="1">
+            <a:schemeClr val="dk1"/>
+          </a:lnRef>
+          <a:fillRef idx="0">
+            <a:schemeClr val="dk1"/>
+          </a:fillRef>
+          <a:effectRef idx="0">
+            <a:schemeClr val="dk1"/>
+          </a:effectRef>
+          <a:fontRef idx="minor">
+            <a:schemeClr val="tx1"/>
+          </a:fontRef>
+        </p:style>
+      </p:cxnSp>
+      <p:cxnSp>
+        <p:nvCxnSpPr>
+          <p:cNvPr id="123" name="Straight Connector 122"/>
+          <p:cNvCxnSpPr/>
+          <p:nvPr/>
+        </p:nvCxnSpPr>
+        <p:spPr>
+          <a:xfrm flipH="1">
+            <a:off x="1187624" y="2564904"/>
+            <a:ext cx="216024" cy="0"/>
+          </a:xfrm>
+          <a:prstGeom prst="line">
+            <a:avLst/>
+          </a:prstGeom>
+          <a:ln w="12700"/>
+        </p:spPr>
+        <p:style>
+          <a:lnRef idx="1">
+            <a:schemeClr val="dk1"/>
+          </a:lnRef>
+          <a:fillRef idx="0">
+            <a:schemeClr val="dk1"/>
+          </a:fillRef>
+          <a:effectRef idx="0">
+            <a:schemeClr val="dk1"/>
+          </a:effectRef>
+          <a:fontRef idx="minor">
+            <a:schemeClr val="tx1"/>
+          </a:fontRef>
+        </p:style>
+      </p:cxnSp>
+      <p:cxnSp>
+        <p:nvCxnSpPr>
+          <p:cNvPr id="124" name="Straight Connector 123"/>
+          <p:cNvCxnSpPr/>
+          <p:nvPr/>
+        </p:nvCxnSpPr>
+        <p:spPr>
+          <a:xfrm>
+            <a:off x="1403648" y="3284984"/>
+            <a:ext cx="0" cy="144016"/>
+          </a:xfrm>
+          <a:prstGeom prst="line">
+            <a:avLst/>
+          </a:prstGeom>
+          <a:ln w="12700"/>
+        </p:spPr>
+        <p:style>
+          <a:lnRef idx="1">
+            <a:schemeClr val="dk1"/>
+          </a:lnRef>
+          <a:fillRef idx="0">
+            <a:schemeClr val="dk1"/>
+          </a:fillRef>
+          <a:effectRef idx="0">
+            <a:schemeClr val="dk1"/>
+          </a:effectRef>
+          <a:fontRef idx="minor">
+            <a:schemeClr val="tx1"/>
+          </a:fontRef>
+        </p:style>
+      </p:cxnSp>
+      <p:cxnSp>
+        <p:nvCxnSpPr>
+          <p:cNvPr id="125" name="Straight Connector 124"/>
+          <p:cNvCxnSpPr/>
+          <p:nvPr/>
+        </p:nvCxnSpPr>
+        <p:spPr>
+          <a:xfrm flipH="1">
+            <a:off x="1187624" y="3429000"/>
+            <a:ext cx="432048" cy="0"/>
+          </a:xfrm>
+          <a:prstGeom prst="line">
+            <a:avLst/>
+          </a:prstGeom>
+          <a:ln w="12700"/>
+        </p:spPr>
+        <p:style>
+          <a:lnRef idx="1">
+            <a:schemeClr val="dk1"/>
+          </a:lnRef>
+          <a:fillRef idx="0">
+            <a:schemeClr val="dk1"/>
+          </a:fillRef>
+          <a:effectRef idx="0">
+            <a:schemeClr val="dk1"/>
+          </a:effectRef>
+          <a:fontRef idx="minor">
+            <a:schemeClr val="tx1"/>
+          </a:fontRef>
+        </p:style>
+      </p:cxnSp>
+      <p:cxnSp>
+        <p:nvCxnSpPr>
+          <p:cNvPr id="126" name="Straight Connector 125"/>
+          <p:cNvCxnSpPr/>
+          <p:nvPr/>
+        </p:nvCxnSpPr>
+        <p:spPr>
+          <a:xfrm flipH="1">
+            <a:off x="1259632" y="3501008"/>
+            <a:ext cx="288032" cy="0"/>
+          </a:xfrm>
+          <a:prstGeom prst="line">
+            <a:avLst/>
+          </a:prstGeom>
+          <a:ln w="12700"/>
+        </p:spPr>
+        <p:style>
+          <a:lnRef idx="1">
+            <a:schemeClr val="dk1"/>
+          </a:lnRef>
+          <a:fillRef idx="0">
+            <a:schemeClr val="dk1"/>
+          </a:fillRef>
+          <a:effectRef idx="0">
+            <a:schemeClr val="dk1"/>
+          </a:effectRef>
+          <a:fontRef idx="minor">
+            <a:schemeClr val="tx1"/>
+          </a:fontRef>
+        </p:style>
+      </p:cxnSp>
+      <p:cxnSp>
+        <p:nvCxnSpPr>
+          <p:cNvPr id="127" name="Straight Connector 126"/>
+          <p:cNvCxnSpPr/>
+          <p:nvPr/>
+        </p:nvCxnSpPr>
+        <p:spPr>
+          <a:xfrm flipH="1">
+            <a:off x="1187624" y="3284984"/>
+            <a:ext cx="216024" cy="0"/>
+          </a:xfrm>
+          <a:prstGeom prst="line">
+            <a:avLst/>
+          </a:prstGeom>
+          <a:ln w="12700"/>
+        </p:spPr>
+        <p:style>
+          <a:lnRef idx="1">
+            <a:schemeClr val="dk1"/>
+          </a:lnRef>
+          <a:fillRef idx="0">
+            <a:schemeClr val="dk1"/>
+          </a:fillRef>
+          <a:effectRef idx="0">
+            <a:schemeClr val="dk1"/>
+          </a:effectRef>
+          <a:fontRef idx="minor">
+            <a:schemeClr val="tx1"/>
+          </a:fontRef>
+        </p:style>
+      </p:cxnSp>
+      <p:cxnSp>
+        <p:nvCxnSpPr>
+          <p:cNvPr id="128" name="Straight Connector 127"/>
+          <p:cNvCxnSpPr/>
+          <p:nvPr/>
+        </p:nvCxnSpPr>
+        <p:spPr>
+          <a:xfrm>
+            <a:off x="1403648" y="3645024"/>
+            <a:ext cx="0" cy="144016"/>
+          </a:xfrm>
+          <a:prstGeom prst="line">
+            <a:avLst/>
+          </a:prstGeom>
+          <a:ln w="12700"/>
+        </p:spPr>
+        <p:style>
+          <a:lnRef idx="1">
+            <a:schemeClr val="dk1"/>
+          </a:lnRef>
+          <a:fillRef idx="0">
+            <a:schemeClr val="dk1"/>
+          </a:fillRef>
+          <a:effectRef idx="0">
+            <a:schemeClr val="dk1"/>
+          </a:effectRef>
+          <a:fontRef idx="minor">
+            <a:schemeClr val="tx1"/>
+          </a:fontRef>
+        </p:style>
+      </p:cxnSp>
+      <p:cxnSp>
+        <p:nvCxnSpPr>
+          <p:cNvPr id="129" name="Straight Connector 128"/>
+          <p:cNvCxnSpPr/>
+          <p:nvPr/>
+        </p:nvCxnSpPr>
+        <p:spPr>
+          <a:xfrm flipH="1">
+            <a:off x="1187624" y="3789040"/>
+            <a:ext cx="432048" cy="0"/>
+          </a:xfrm>
+          <a:prstGeom prst="line">
+            <a:avLst/>
+          </a:prstGeom>
+          <a:ln w="12700"/>
+        </p:spPr>
+        <p:style>
+          <a:lnRef idx="1">
+            <a:schemeClr val="dk1"/>
+          </a:lnRef>
+          <a:fillRef idx="0">
+            <a:schemeClr val="dk1"/>
+          </a:fillRef>
+          <a:effectRef idx="0">
+            <a:schemeClr val="dk1"/>
+          </a:effectRef>
+          <a:fontRef idx="minor">
+            <a:schemeClr val="tx1"/>
+          </a:fontRef>
+        </p:style>
+      </p:cxnSp>
+      <p:cxnSp>
+        <p:nvCxnSpPr>
+          <p:cNvPr id="130" name="Straight Connector 129"/>
+          <p:cNvCxnSpPr/>
+          <p:nvPr/>
+        </p:nvCxnSpPr>
+        <p:spPr>
+          <a:xfrm flipH="1">
+            <a:off x="1259632" y="3861048"/>
+            <a:ext cx="288032" cy="0"/>
+          </a:xfrm>
+          <a:prstGeom prst="line">
+            <a:avLst/>
+          </a:prstGeom>
+          <a:ln w="12700"/>
+        </p:spPr>
+        <p:style>
+          <a:lnRef idx="1">
+            <a:schemeClr val="dk1"/>
+          </a:lnRef>
+          <a:fillRef idx="0">
+            <a:schemeClr val="dk1"/>
+          </a:fillRef>
+          <a:effectRef idx="0">
+            <a:schemeClr val="dk1"/>
+          </a:effectRef>
+          <a:fontRef idx="minor">
+            <a:schemeClr val="tx1"/>
+          </a:fontRef>
+        </p:style>
+      </p:cxnSp>
+      <p:cxnSp>
+        <p:nvCxnSpPr>
+          <p:cNvPr id="131" name="Straight Connector 130"/>
+          <p:cNvCxnSpPr/>
+          <p:nvPr/>
+        </p:nvCxnSpPr>
+        <p:spPr>
+          <a:xfrm flipH="1">
+            <a:off x="1187624" y="3645024"/>
+            <a:ext cx="216024" cy="0"/>
+          </a:xfrm>
+          <a:prstGeom prst="line">
+            <a:avLst/>
+          </a:prstGeom>
+          <a:ln w="12700"/>
+        </p:spPr>
+        <p:style>
+          <a:lnRef idx="1">
+            <a:schemeClr val="dk1"/>
+          </a:lnRef>
+          <a:fillRef idx="0">
+            <a:schemeClr val="dk1"/>
+          </a:fillRef>
+          <a:effectRef idx="0">
+            <a:schemeClr val="dk1"/>
+          </a:effectRef>
+          <a:fontRef idx="minor">
+            <a:schemeClr val="tx1"/>
+          </a:fontRef>
+        </p:style>
+      </p:cxnSp>
+      <p:cxnSp>
+        <p:nvCxnSpPr>
+          <p:cNvPr id="132" name="Straight Connector 131"/>
+          <p:cNvCxnSpPr/>
+          <p:nvPr/>
+        </p:nvCxnSpPr>
+        <p:spPr>
+          <a:xfrm>
+            <a:off x="1403648" y="4005064"/>
+            <a:ext cx="0" cy="144016"/>
+          </a:xfrm>
+          <a:prstGeom prst="line">
+            <a:avLst/>
+          </a:prstGeom>
+          <a:ln w="12700"/>
+        </p:spPr>
+        <p:style>
+          <a:lnRef idx="1">
+            <a:schemeClr val="dk1"/>
+          </a:lnRef>
+          <a:fillRef idx="0">
+            <a:schemeClr val="dk1"/>
+          </a:fillRef>
+          <a:effectRef idx="0">
+            <a:schemeClr val="dk1"/>
+          </a:effectRef>
+          <a:fontRef idx="minor">
+            <a:schemeClr val="tx1"/>
+          </a:fontRef>
+        </p:style>
+      </p:cxnSp>
+      <p:cxnSp>
+        <p:nvCxnSpPr>
+          <p:cNvPr id="133" name="Straight Connector 132"/>
+          <p:cNvCxnSpPr/>
+          <p:nvPr/>
+        </p:nvCxnSpPr>
+        <p:spPr>
+          <a:xfrm flipH="1">
+            <a:off x="1187624" y="4149080"/>
+            <a:ext cx="432048" cy="0"/>
+          </a:xfrm>
+          <a:prstGeom prst="line">
+            <a:avLst/>
+          </a:prstGeom>
+          <a:ln w="12700"/>
+        </p:spPr>
+        <p:style>
+          <a:lnRef idx="1">
+            <a:schemeClr val="dk1"/>
+          </a:lnRef>
+          <a:fillRef idx="0">
+            <a:schemeClr val="dk1"/>
+          </a:fillRef>
+          <a:effectRef idx="0">
+            <a:schemeClr val="dk1"/>
+          </a:effectRef>
+          <a:fontRef idx="minor">
+            <a:schemeClr val="tx1"/>
+          </a:fontRef>
+        </p:style>
+      </p:cxnSp>
+      <p:cxnSp>
+        <p:nvCxnSpPr>
+          <p:cNvPr id="134" name="Straight Connector 133"/>
+          <p:cNvCxnSpPr/>
+          <p:nvPr/>
+        </p:nvCxnSpPr>
+        <p:spPr>
+          <a:xfrm flipH="1">
+            <a:off x="1259632" y="4221088"/>
+            <a:ext cx="288032" cy="0"/>
+          </a:xfrm>
+          <a:prstGeom prst="line">
+            <a:avLst/>
+          </a:prstGeom>
+          <a:ln w="12700"/>
+        </p:spPr>
+        <p:style>
+          <a:lnRef idx="1">
+            <a:schemeClr val="dk1"/>
+          </a:lnRef>
+          <a:fillRef idx="0">
+            <a:schemeClr val="dk1"/>
+          </a:fillRef>
+          <a:effectRef idx="0">
+            <a:schemeClr val="dk1"/>
+          </a:effectRef>
+          <a:fontRef idx="minor">
+            <a:schemeClr val="tx1"/>
+          </a:fontRef>
+        </p:style>
+      </p:cxnSp>
+      <p:cxnSp>
+        <p:nvCxnSpPr>
+          <p:cNvPr id="135" name="Straight Connector 134"/>
+          <p:cNvCxnSpPr/>
+          <p:nvPr/>
+        </p:nvCxnSpPr>
+        <p:spPr>
+          <a:xfrm flipH="1">
+            <a:off x="1187624" y="4005064"/>
+            <a:ext cx="216024" cy="0"/>
+          </a:xfrm>
+          <a:prstGeom prst="line">
+            <a:avLst/>
+          </a:prstGeom>
+          <a:ln w="12700"/>
+        </p:spPr>
+        <p:style>
+          <a:lnRef idx="1">
+            <a:schemeClr val="dk1"/>
+          </a:lnRef>
+          <a:fillRef idx="0">
+            <a:schemeClr val="dk1"/>
+          </a:fillRef>
+          <a:effectRef idx="0">
+            <a:schemeClr val="dk1"/>
+          </a:effectRef>
+          <a:fontRef idx="minor">
+            <a:schemeClr val="tx1"/>
+          </a:fontRef>
+        </p:style>
+      </p:cxnSp>
+      <p:grpSp>
+        <p:nvGrpSpPr>
+          <p:cNvPr id="98" name="Group 97"/>
+          <p:cNvGrpSpPr/>
+          <p:nvPr/>
+        </p:nvGrpSpPr>
+        <p:grpSpPr>
+          <a:xfrm>
+            <a:off x="7020272" y="1844824"/>
+            <a:ext cx="659476" cy="523801"/>
+            <a:chOff x="4572000" y="2492896"/>
+            <a:chExt cx="659476" cy="523801"/>
+          </a:xfrm>
+        </p:grpSpPr>
+        <p:sp>
+          <p:nvSpPr>
+            <p:cNvPr id="99" name="Freeform 98"/>
+            <p:cNvSpPr/>
+            <p:nvPr/>
+          </p:nvSpPr>
+          <p:spPr>
+            <a:xfrm>
+              <a:off x="4754336" y="2492896"/>
+              <a:ext cx="235404" cy="331947"/>
+            </a:xfrm>
+            <a:custGeom>
+              <a:avLst/>
+              <a:gdLst>
+                <a:gd name="connsiteX0" fmla="*/ 201385 w 235404"/>
+                <a:gd name="connsiteY0" fmla="*/ 261257 h 261257"/>
+                <a:gd name="connsiteX1" fmla="*/ 5443 w 235404"/>
+                <a:gd name="connsiteY1" fmla="*/ 195943 h 261257"/>
+                <a:gd name="connsiteX2" fmla="*/ 234043 w 235404"/>
+                <a:gd name="connsiteY2" fmla="*/ 138793 h 261257"/>
+                <a:gd name="connsiteX3" fmla="*/ 13607 w 235404"/>
+                <a:gd name="connsiteY3" fmla="*/ 106135 h 261257"/>
+                <a:gd name="connsiteX4" fmla="*/ 193221 w 235404"/>
+                <a:gd name="connsiteY4" fmla="*/ 32657 h 261257"/>
+                <a:gd name="connsiteX5" fmla="*/ 46264 w 235404"/>
+                <a:gd name="connsiteY5" fmla="*/ 0 h 261257"/>
+                <a:gd name="connsiteX6" fmla="*/ 46264 w 235404"/>
+                <a:gd name="connsiteY6" fmla="*/ 0 h 261257"/>
+                <a:gd name="connsiteX7" fmla="*/ 46264 w 235404"/>
+                <a:gd name="connsiteY7" fmla="*/ 0 h 261257"/>
+              </a:gdLst>
+              <a:ahLst/>
+              <a:cxnLst>
+                <a:cxn ang="0">
+                  <a:pos x="connsiteX0" y="connsiteY0"/>
+                </a:cxn>
+                <a:cxn ang="0">
+                  <a:pos x="connsiteX1" y="connsiteY1"/>
+                </a:cxn>
+                <a:cxn ang="0">
+                  <a:pos x="connsiteX2" y="connsiteY2"/>
+                </a:cxn>
+                <a:cxn ang="0">
+                  <a:pos x="connsiteX3" y="connsiteY3"/>
+                </a:cxn>
+                <a:cxn ang="0">
+                  <a:pos x="connsiteX4" y="connsiteY4"/>
+                </a:cxn>
+                <a:cxn ang="0">
+                  <a:pos x="connsiteX5" y="connsiteY5"/>
+                </a:cxn>
+                <a:cxn ang="0">
+                  <a:pos x="connsiteX6" y="connsiteY6"/>
+                </a:cxn>
+                <a:cxn ang="0">
+                  <a:pos x="connsiteX7" y="connsiteY7"/>
+                </a:cxn>
+              </a:cxnLst>
+              <a:rect l="l" t="t" r="r" b="b"/>
+              <a:pathLst>
+                <a:path w="235404" h="261257">
+                  <a:moveTo>
+                    <a:pt x="201385" y="261257"/>
+                  </a:moveTo>
+                  <a:cubicBezTo>
+                    <a:pt x="100692" y="238805"/>
+                    <a:pt x="0" y="216354"/>
+                    <a:pt x="5443" y="195943"/>
+                  </a:cubicBezTo>
+                  <a:cubicBezTo>
+                    <a:pt x="10886" y="175532"/>
+                    <a:pt x="232682" y="153761"/>
+                    <a:pt x="234043" y="138793"/>
+                  </a:cubicBezTo>
+                  <a:cubicBezTo>
+                    <a:pt x="235404" y="123825"/>
+                    <a:pt x="20411" y="123824"/>
+                    <a:pt x="13607" y="106135"/>
+                  </a:cubicBezTo>
+                  <a:cubicBezTo>
+                    <a:pt x="6803" y="88446"/>
+                    <a:pt x="187778" y="50346"/>
+                    <a:pt x="193221" y="32657"/>
+                  </a:cubicBezTo>
+                  <a:cubicBezTo>
+                    <a:pt x="198664" y="14968"/>
+                    <a:pt x="46264" y="0"/>
+                    <a:pt x="46264" y="0"/>
+                  </a:cubicBezTo>
+                  <a:lnTo>
+                    <a:pt x="46264" y="0"/>
+                  </a:lnTo>
+                  <a:lnTo>
+                    <a:pt x="46264" y="0"/>
+                  </a:lnTo>
+                </a:path>
+              </a:pathLst>
+            </a:custGeom>
+          </p:spPr>
+          <p:style>
+            <a:lnRef idx="1">
+              <a:schemeClr val="dk1"/>
+            </a:lnRef>
+            <a:fillRef idx="0">
+              <a:schemeClr val="dk1"/>
+            </a:fillRef>
+            <a:effectRef idx="0">
+              <a:schemeClr val="dk1"/>
+            </a:effectRef>
+            <a:fontRef idx="minor">
+              <a:schemeClr val="tx1"/>
+            </a:fontRef>
+          </p:style>
+          <p:txBody>
+            <a:bodyPr rtlCol="0" anchor="ctr"/>
+            <a:lstStyle/>
+            <a:p>
+              <a:pPr algn="ctr"/>
+              <a:endParaRPr lang="en-US"/>
+            </a:p>
+          </p:txBody>
+        </p:sp>
+        <p:sp>
+          <p:nvSpPr>
+            <p:cNvPr id="101" name="TextBox 100"/>
+            <p:cNvSpPr txBox="1"/>
+            <p:nvPr/>
+          </p:nvSpPr>
+          <p:spPr>
+            <a:xfrm>
+              <a:off x="4572000" y="2708920"/>
+              <a:ext cx="659476" cy="307777"/>
+            </a:xfrm>
+            <a:prstGeom prst="rect">
+              <a:avLst/>
+            </a:prstGeom>
+            <a:noFill/>
+          </p:spPr>
+          <p:txBody>
+            <a:bodyPr wrap="none" rtlCol="0">
+              <a:spAutoFit/>
+            </a:bodyPr>
+            <a:lstStyle/>
+            <a:p>
+              <a:pPr algn="l" rtl="0"/>
+              <a:r>
+                <a:rPr lang="en-US" sz="1400" dirty="0" smtClean="0"/>
+                <a:t>prod </a:t>
+              </a:r>
+              <a:r>
+                <a:rPr lang="en-US" sz="1400" dirty="0" smtClean="0"/>
+                <a:t>0</a:t>
+              </a:r>
+              <a:endParaRPr lang="en-US" dirty="0"/>
+            </a:p>
+          </p:txBody>
+        </p:sp>
+      </p:grpSp>
+      <p:sp>
+        <p:nvSpPr>
+          <p:cNvPr id="103" name="Rectangle 102"/>
+          <p:cNvSpPr/>
+          <p:nvPr/>
+        </p:nvSpPr>
+        <p:spPr>
+          <a:xfrm>
+            <a:off x="6588224" y="2348879"/>
+            <a:ext cx="576064" cy="288032"/>
+          </a:xfrm>
+          <a:prstGeom prst="rect">
+            <a:avLst/>
+          </a:prstGeom>
+          <a:noFill/>
+          <a:ln w="12700"/>
+        </p:spPr>
+        <p:style>
+          <a:lnRef idx="2">
+            <a:schemeClr val="dk1">
+              <a:shade val="50000"/>
+            </a:schemeClr>
+          </a:lnRef>
+          <a:fillRef idx="1">
+            <a:schemeClr val="dk1"/>
+          </a:fillRef>
+          <a:effectRef idx="0">
+            <a:schemeClr val="dk1"/>
+          </a:effectRef>
+          <a:fontRef idx="minor">
+            <a:schemeClr val="lt1"/>
+          </a:fontRef>
+        </p:style>
+        <p:txBody>
+          <a:bodyPr rtlCol="0" anchor="ctr"/>
+          <a:lstStyle/>
+          <a:p>
+            <a:pPr algn="ctr"/>
+            <a:endParaRPr lang="en-US"/>
+          </a:p>
+        </p:txBody>
+      </p:sp>
+      <p:cxnSp>
+        <p:nvCxnSpPr>
+          <p:cNvPr id="137" name="Straight Connector 136"/>
+          <p:cNvCxnSpPr/>
+          <p:nvPr/>
+        </p:nvCxnSpPr>
+        <p:spPr>
+          <a:xfrm>
+            <a:off x="6588224" y="2348879"/>
+            <a:ext cx="288032" cy="144016"/>
+          </a:xfrm>
+          <a:prstGeom prst="line">
+            <a:avLst/>
+          </a:prstGeom>
+          <a:ln w="12700"/>
+        </p:spPr>
+        <p:style>
+          <a:lnRef idx="1">
+            <a:schemeClr val="dk1"/>
+          </a:lnRef>
+          <a:fillRef idx="0">
+            <a:schemeClr val="dk1"/>
+          </a:fillRef>
+          <a:effectRef idx="0">
+            <a:schemeClr val="dk1"/>
+          </a:effectRef>
+          <a:fontRef idx="minor">
+            <a:schemeClr val="tx1"/>
+          </a:fontRef>
+        </p:style>
+      </p:cxnSp>
+      <p:cxnSp>
+        <p:nvCxnSpPr>
+          <p:cNvPr id="140" name="Straight Connector 139"/>
+          <p:cNvCxnSpPr/>
+          <p:nvPr/>
+        </p:nvCxnSpPr>
+        <p:spPr>
+          <a:xfrm flipV="1">
+            <a:off x="6876256" y="2348879"/>
+            <a:ext cx="288032" cy="144016"/>
+          </a:xfrm>
+          <a:prstGeom prst="line">
+            <a:avLst/>
+          </a:prstGeom>
+          <a:ln w="12700"/>
+        </p:spPr>
+        <p:style>
+          <a:lnRef idx="1">
+            <a:schemeClr val="dk1"/>
+          </a:lnRef>
+          <a:fillRef idx="0">
+            <a:schemeClr val="dk1"/>
+          </a:fillRef>
+          <a:effectRef idx="0">
+            <a:schemeClr val="dk1"/>
+          </a:effectRef>
+          <a:fontRef idx="minor">
+            <a:schemeClr val="tx1"/>
+          </a:fontRef>
+        </p:style>
+      </p:cxnSp>
+      <p:sp>
+        <p:nvSpPr>
+          <p:cNvPr id="143" name="TextBox 142"/>
+          <p:cNvSpPr txBox="1"/>
+          <p:nvPr/>
+        </p:nvSpPr>
+        <p:spPr>
+          <a:xfrm>
+            <a:off x="6588224" y="2564904"/>
+            <a:ext cx="569645" cy="307777"/>
+          </a:xfrm>
+          <a:prstGeom prst="rect">
+            <a:avLst/>
+          </a:prstGeom>
+          <a:noFill/>
+        </p:spPr>
+        <p:txBody>
+          <a:bodyPr wrap="square" rtlCol="0">
+            <a:spAutoFit/>
+          </a:bodyPr>
+          <a:lstStyle/>
+          <a:p>
+            <a:pPr algn="ctr" rtl="0"/>
             <a:r>
               <a:rPr lang="en-US" sz="1400" dirty="0" smtClean="0"/>
-              <a:t>l</a:t>
+              <a:t>Task</a:t>
             </a:r>
             <a:endParaRPr lang="en-US" dirty="0"/>
           </a:p>
@@ -7708,45 +8654,263 @@
       </p:sp>
       <p:cxnSp>
         <p:nvCxnSpPr>
-          <p:cNvPr id="115" name="Straight Connector 114"/>
-          <p:cNvCxnSpPr/>
+          <p:cNvPr id="145" name="Straight Arrow Connector 144"/>
+          <p:cNvCxnSpPr>
+            <a:stCxn id="103" idx="1"/>
+          </p:cNvCxnSpPr>
           <p:nvPr/>
         </p:nvCxnSpPr>
         <p:spPr>
           <a:xfrm flipH="1">
-            <a:off x="1907704" y="4221088"/>
-            <a:ext cx="576064" cy="0"/>
-          </a:xfrm>
-          <a:prstGeom prst="line">
-            <a:avLst/>
-          </a:prstGeom>
+            <a:off x="5436096" y="2492895"/>
+            <a:ext cx="1152128" cy="648073"/>
+          </a:xfrm>
+          <a:prstGeom prst="straightConnector1">
+            <a:avLst/>
+          </a:prstGeom>
+          <a:ln w="12700">
+            <a:tailEnd type="arrow"/>
+          </a:ln>
+        </p:spPr>
+        <p:style>
+          <a:lnRef idx="1">
+            <a:schemeClr val="dk1"/>
+          </a:lnRef>
+          <a:fillRef idx="0">
+            <a:schemeClr val="dk1"/>
+          </a:fillRef>
+          <a:effectRef idx="0">
+            <a:schemeClr val="dk1"/>
+          </a:effectRef>
+          <a:fontRef idx="minor">
+            <a:schemeClr val="tx1"/>
+          </a:fontRef>
+        </p:style>
+      </p:cxnSp>
+      <p:grpSp>
+        <p:nvGrpSpPr>
+          <p:cNvPr id="150" name="Group 149"/>
+          <p:cNvGrpSpPr/>
+          <p:nvPr/>
+        </p:nvGrpSpPr>
+        <p:grpSpPr>
+          <a:xfrm>
+            <a:off x="7020272" y="3356992"/>
+            <a:ext cx="659476" cy="523801"/>
+            <a:chOff x="4572000" y="2492896"/>
+            <a:chExt cx="659476" cy="523801"/>
+          </a:xfrm>
+        </p:grpSpPr>
+        <p:sp>
+          <p:nvSpPr>
+            <p:cNvPr id="151" name="Freeform 150"/>
+            <p:cNvSpPr/>
+            <p:nvPr/>
+          </p:nvSpPr>
+          <p:spPr>
+            <a:xfrm>
+              <a:off x="4754336" y="2492896"/>
+              <a:ext cx="235404" cy="331947"/>
+            </a:xfrm>
+            <a:custGeom>
+              <a:avLst/>
+              <a:gdLst>
+                <a:gd name="connsiteX0" fmla="*/ 201385 w 235404"/>
+                <a:gd name="connsiteY0" fmla="*/ 261257 h 261257"/>
+                <a:gd name="connsiteX1" fmla="*/ 5443 w 235404"/>
+                <a:gd name="connsiteY1" fmla="*/ 195943 h 261257"/>
+                <a:gd name="connsiteX2" fmla="*/ 234043 w 235404"/>
+                <a:gd name="connsiteY2" fmla="*/ 138793 h 261257"/>
+                <a:gd name="connsiteX3" fmla="*/ 13607 w 235404"/>
+                <a:gd name="connsiteY3" fmla="*/ 106135 h 261257"/>
+                <a:gd name="connsiteX4" fmla="*/ 193221 w 235404"/>
+                <a:gd name="connsiteY4" fmla="*/ 32657 h 261257"/>
+                <a:gd name="connsiteX5" fmla="*/ 46264 w 235404"/>
+                <a:gd name="connsiteY5" fmla="*/ 0 h 261257"/>
+                <a:gd name="connsiteX6" fmla="*/ 46264 w 235404"/>
+                <a:gd name="connsiteY6" fmla="*/ 0 h 261257"/>
+                <a:gd name="connsiteX7" fmla="*/ 46264 w 235404"/>
+                <a:gd name="connsiteY7" fmla="*/ 0 h 261257"/>
+              </a:gdLst>
+              <a:ahLst/>
+              <a:cxnLst>
+                <a:cxn ang="0">
+                  <a:pos x="connsiteX0" y="connsiteY0"/>
+                </a:cxn>
+                <a:cxn ang="0">
+                  <a:pos x="connsiteX1" y="connsiteY1"/>
+                </a:cxn>
+                <a:cxn ang="0">
+                  <a:pos x="connsiteX2" y="connsiteY2"/>
+                </a:cxn>
+                <a:cxn ang="0">
+                  <a:pos x="connsiteX3" y="connsiteY3"/>
+                </a:cxn>
+                <a:cxn ang="0">
+                  <a:pos x="connsiteX4" y="connsiteY4"/>
+                </a:cxn>
+                <a:cxn ang="0">
+                  <a:pos x="connsiteX5" y="connsiteY5"/>
+                </a:cxn>
+                <a:cxn ang="0">
+                  <a:pos x="connsiteX6" y="connsiteY6"/>
+                </a:cxn>
+                <a:cxn ang="0">
+                  <a:pos x="connsiteX7" y="connsiteY7"/>
+                </a:cxn>
+              </a:cxnLst>
+              <a:rect l="l" t="t" r="r" b="b"/>
+              <a:pathLst>
+                <a:path w="235404" h="261257">
+                  <a:moveTo>
+                    <a:pt x="201385" y="261257"/>
+                  </a:moveTo>
+                  <a:cubicBezTo>
+                    <a:pt x="100692" y="238805"/>
+                    <a:pt x="0" y="216354"/>
+                    <a:pt x="5443" y="195943"/>
+                  </a:cubicBezTo>
+                  <a:cubicBezTo>
+                    <a:pt x="10886" y="175532"/>
+                    <a:pt x="232682" y="153761"/>
+                    <a:pt x="234043" y="138793"/>
+                  </a:cubicBezTo>
+                  <a:cubicBezTo>
+                    <a:pt x="235404" y="123825"/>
+                    <a:pt x="20411" y="123824"/>
+                    <a:pt x="13607" y="106135"/>
+                  </a:cubicBezTo>
+                  <a:cubicBezTo>
+                    <a:pt x="6803" y="88446"/>
+                    <a:pt x="187778" y="50346"/>
+                    <a:pt x="193221" y="32657"/>
+                  </a:cubicBezTo>
+                  <a:cubicBezTo>
+                    <a:pt x="198664" y="14968"/>
+                    <a:pt x="46264" y="0"/>
+                    <a:pt x="46264" y="0"/>
+                  </a:cubicBezTo>
+                  <a:lnTo>
+                    <a:pt x="46264" y="0"/>
+                  </a:lnTo>
+                  <a:lnTo>
+                    <a:pt x="46264" y="0"/>
+                  </a:lnTo>
+                </a:path>
+              </a:pathLst>
+            </a:custGeom>
+          </p:spPr>
+          <p:style>
+            <a:lnRef idx="1">
+              <a:schemeClr val="dk1"/>
+            </a:lnRef>
+            <a:fillRef idx="0">
+              <a:schemeClr val="dk1"/>
+            </a:fillRef>
+            <a:effectRef idx="0">
+              <a:schemeClr val="dk1"/>
+            </a:effectRef>
+            <a:fontRef idx="minor">
+              <a:schemeClr val="tx1"/>
+            </a:fontRef>
+          </p:style>
+          <p:txBody>
+            <a:bodyPr rtlCol="0" anchor="ctr"/>
+            <a:lstStyle/>
+            <a:p>
+              <a:pPr algn="ctr"/>
+              <a:endParaRPr lang="en-US"/>
+            </a:p>
+          </p:txBody>
+        </p:sp>
+        <p:sp>
+          <p:nvSpPr>
+            <p:cNvPr id="152" name="TextBox 151"/>
+            <p:cNvSpPr txBox="1"/>
+            <p:nvPr/>
+          </p:nvSpPr>
+          <p:spPr>
+            <a:xfrm>
+              <a:off x="4572000" y="2708920"/>
+              <a:ext cx="659476" cy="307777"/>
+            </a:xfrm>
+            <a:prstGeom prst="rect">
+              <a:avLst/>
+            </a:prstGeom>
+            <a:noFill/>
+          </p:spPr>
+          <p:txBody>
+            <a:bodyPr wrap="none" rtlCol="0">
+              <a:spAutoFit/>
+            </a:bodyPr>
+            <a:lstStyle/>
+            <a:p>
+              <a:pPr algn="l" rtl="0"/>
+              <a:r>
+                <a:rPr lang="en-US" sz="1400" dirty="0" smtClean="0"/>
+                <a:t>prod </a:t>
+              </a:r>
+              <a:r>
+                <a:rPr lang="en-US" sz="1400" dirty="0" smtClean="0"/>
+                <a:t>3</a:t>
+              </a:r>
+              <a:endParaRPr lang="en-US" dirty="0"/>
+            </a:p>
+          </p:txBody>
+        </p:sp>
+      </p:grpSp>
+      <p:sp>
+        <p:nvSpPr>
+          <p:cNvPr id="153" name="Rectangle 152"/>
+          <p:cNvSpPr/>
+          <p:nvPr/>
+        </p:nvSpPr>
+        <p:spPr>
+          <a:xfrm>
+            <a:off x="6588224" y="3861047"/>
+            <a:ext cx="576064" cy="288032"/>
+          </a:xfrm>
+          <a:prstGeom prst="rect">
+            <a:avLst/>
+          </a:prstGeom>
+          <a:noFill/>
           <a:ln w="12700"/>
         </p:spPr>
         <p:style>
-          <a:lnRef idx="1">
-            <a:schemeClr val="dk1"/>
-          </a:lnRef>
-          <a:fillRef idx="0">
-            <a:schemeClr val="dk1"/>
-          </a:fillRef>
-          <a:effectRef idx="0">
-            <a:schemeClr val="dk1"/>
-          </a:effectRef>
-          <a:fontRef idx="minor">
-            <a:schemeClr val="tx1"/>
-          </a:fontRef>
-        </p:style>
-      </p:cxnSp>
-      <p:cxnSp>
-        <p:nvCxnSpPr>
-          <p:cNvPr id="116" name="Straight Connector 115"/>
-          <p:cNvCxnSpPr/>
-          <p:nvPr/>
-        </p:nvCxnSpPr>
-        <p:spPr>
-          <a:xfrm>
-            <a:off x="2699792" y="2204864"/>
-            <a:ext cx="0" cy="144016"/>
+          <a:lnRef idx="2">
+            <a:schemeClr val="dk1">
+              <a:shade val="50000"/>
+            </a:schemeClr>
+          </a:lnRef>
+          <a:fillRef idx="1">
+            <a:schemeClr val="dk1"/>
+          </a:fillRef>
+          <a:effectRef idx="0">
+            <a:schemeClr val="dk1"/>
+          </a:effectRef>
+          <a:fontRef idx="minor">
+            <a:schemeClr val="lt1"/>
+          </a:fontRef>
+        </p:style>
+        <p:txBody>
+          <a:bodyPr rtlCol="0" anchor="ctr"/>
+          <a:lstStyle/>
+          <a:p>
+            <a:pPr algn="ctr"/>
+            <a:endParaRPr lang="en-US"/>
+          </a:p>
+        </p:txBody>
+      </p:sp>
+      <p:cxnSp>
+        <p:nvCxnSpPr>
+          <p:cNvPr id="154" name="Straight Connector 153"/>
+          <p:cNvCxnSpPr/>
+          <p:nvPr/>
+        </p:nvCxnSpPr>
+        <p:spPr>
+          <a:xfrm>
+            <a:off x="6588224" y="3861047"/>
+            <a:ext cx="288032" cy="144016"/>
           </a:xfrm>
           <a:prstGeom prst="line">
             <a:avLst/>
@@ -7770,577 +8934,85 @@
       </p:cxnSp>
       <p:cxnSp>
         <p:nvCxnSpPr>
-          <p:cNvPr id="117" name="Straight Connector 116"/>
-          <p:cNvCxnSpPr/>
+          <p:cNvPr id="155" name="Straight Connector 154"/>
+          <p:cNvCxnSpPr/>
+          <p:nvPr/>
+        </p:nvCxnSpPr>
+        <p:spPr>
+          <a:xfrm flipV="1">
+            <a:off x="6876256" y="3861047"/>
+            <a:ext cx="288032" cy="144016"/>
+          </a:xfrm>
+          <a:prstGeom prst="line">
+            <a:avLst/>
+          </a:prstGeom>
+          <a:ln w="12700"/>
+        </p:spPr>
+        <p:style>
+          <a:lnRef idx="1">
+            <a:schemeClr val="dk1"/>
+          </a:lnRef>
+          <a:fillRef idx="0">
+            <a:schemeClr val="dk1"/>
+          </a:fillRef>
+          <a:effectRef idx="0">
+            <a:schemeClr val="dk1"/>
+          </a:effectRef>
+          <a:fontRef idx="minor">
+            <a:schemeClr val="tx1"/>
+          </a:fontRef>
+        </p:style>
+      </p:cxnSp>
+      <p:sp>
+        <p:nvSpPr>
+          <p:cNvPr id="156" name="TextBox 155"/>
+          <p:cNvSpPr txBox="1"/>
+          <p:nvPr/>
+        </p:nvSpPr>
+        <p:spPr>
+          <a:xfrm>
+            <a:off x="6588224" y="4077072"/>
+            <a:ext cx="569645" cy="307777"/>
+          </a:xfrm>
+          <a:prstGeom prst="rect">
+            <a:avLst/>
+          </a:prstGeom>
+          <a:noFill/>
+        </p:spPr>
+        <p:txBody>
+          <a:bodyPr wrap="square" rtlCol="0">
+            <a:spAutoFit/>
+          </a:bodyPr>
+          <a:lstStyle/>
+          <a:p>
+            <a:pPr algn="ctr" rtl="0"/>
+            <a:r>
+              <a:rPr lang="en-US" sz="1400" dirty="0" smtClean="0"/>
+              <a:t>Task</a:t>
+            </a:r>
+            <a:endParaRPr lang="en-US" dirty="0"/>
+          </a:p>
+        </p:txBody>
+      </p:sp>
+      <p:cxnSp>
+        <p:nvCxnSpPr>
+          <p:cNvPr id="157" name="Straight Arrow Connector 156"/>
+          <p:cNvCxnSpPr>
+            <a:stCxn id="153" idx="1"/>
+          </p:cNvCxnSpPr>
           <p:nvPr/>
         </p:nvCxnSpPr>
         <p:spPr>
           <a:xfrm flipH="1">
-            <a:off x="2483768" y="2348880"/>
-            <a:ext cx="432048" cy="0"/>
-          </a:xfrm>
-          <a:prstGeom prst="line">
-            <a:avLst/>
-          </a:prstGeom>
-          <a:ln w="12700"/>
-        </p:spPr>
-        <p:style>
-          <a:lnRef idx="1">
-            <a:schemeClr val="dk1"/>
-          </a:lnRef>
-          <a:fillRef idx="0">
-            <a:schemeClr val="dk1"/>
-          </a:fillRef>
-          <a:effectRef idx="0">
-            <a:schemeClr val="dk1"/>
-          </a:effectRef>
-          <a:fontRef idx="minor">
-            <a:schemeClr val="tx1"/>
-          </a:fontRef>
-        </p:style>
-      </p:cxnSp>
-      <p:cxnSp>
-        <p:nvCxnSpPr>
-          <p:cNvPr id="118" name="Straight Connector 117"/>
-          <p:cNvCxnSpPr/>
-          <p:nvPr/>
-        </p:nvCxnSpPr>
-        <p:spPr>
-          <a:xfrm flipH="1">
-            <a:off x="2555776" y="2420888"/>
-            <a:ext cx="288032" cy="0"/>
-          </a:xfrm>
-          <a:prstGeom prst="line">
-            <a:avLst/>
-          </a:prstGeom>
-          <a:ln w="12700"/>
-        </p:spPr>
-        <p:style>
-          <a:lnRef idx="1">
-            <a:schemeClr val="dk1"/>
-          </a:lnRef>
-          <a:fillRef idx="0">
-            <a:schemeClr val="dk1"/>
-          </a:fillRef>
-          <a:effectRef idx="0">
-            <a:schemeClr val="dk1"/>
-          </a:effectRef>
-          <a:fontRef idx="minor">
-            <a:schemeClr val="tx1"/>
-          </a:fontRef>
-        </p:style>
-      </p:cxnSp>
-      <p:cxnSp>
-        <p:nvCxnSpPr>
-          <p:cNvPr id="119" name="Straight Connector 118"/>
-          <p:cNvCxnSpPr/>
-          <p:nvPr/>
-        </p:nvCxnSpPr>
-        <p:spPr>
-          <a:xfrm flipH="1">
-            <a:off x="2483768" y="2204864"/>
-            <a:ext cx="216024" cy="0"/>
-          </a:xfrm>
-          <a:prstGeom prst="line">
-            <a:avLst/>
-          </a:prstGeom>
-          <a:ln w="12700"/>
-        </p:spPr>
-        <p:style>
-          <a:lnRef idx="1">
-            <a:schemeClr val="dk1"/>
-          </a:lnRef>
-          <a:fillRef idx="0">
-            <a:schemeClr val="dk1"/>
-          </a:fillRef>
-          <a:effectRef idx="0">
-            <a:schemeClr val="dk1"/>
-          </a:effectRef>
-          <a:fontRef idx="minor">
-            <a:schemeClr val="tx1"/>
-          </a:fontRef>
-        </p:style>
-      </p:cxnSp>
-      <p:cxnSp>
-        <p:nvCxnSpPr>
-          <p:cNvPr id="120" name="Straight Connector 119"/>
-          <p:cNvCxnSpPr/>
-          <p:nvPr/>
-        </p:nvCxnSpPr>
-        <p:spPr>
-          <a:xfrm>
-            <a:off x="2699792" y="2564904"/>
-            <a:ext cx="0" cy="144016"/>
-          </a:xfrm>
-          <a:prstGeom prst="line">
-            <a:avLst/>
-          </a:prstGeom>
-          <a:ln w="12700"/>
-        </p:spPr>
-        <p:style>
-          <a:lnRef idx="1">
-            <a:schemeClr val="dk1"/>
-          </a:lnRef>
-          <a:fillRef idx="0">
-            <a:schemeClr val="dk1"/>
-          </a:fillRef>
-          <a:effectRef idx="0">
-            <a:schemeClr val="dk1"/>
-          </a:effectRef>
-          <a:fontRef idx="minor">
-            <a:schemeClr val="tx1"/>
-          </a:fontRef>
-        </p:style>
-      </p:cxnSp>
-      <p:cxnSp>
-        <p:nvCxnSpPr>
-          <p:cNvPr id="121" name="Straight Connector 120"/>
-          <p:cNvCxnSpPr/>
-          <p:nvPr/>
-        </p:nvCxnSpPr>
-        <p:spPr>
-          <a:xfrm flipH="1">
-            <a:off x="2483768" y="2708920"/>
-            <a:ext cx="432048" cy="0"/>
-          </a:xfrm>
-          <a:prstGeom prst="line">
-            <a:avLst/>
-          </a:prstGeom>
-          <a:ln w="12700"/>
-        </p:spPr>
-        <p:style>
-          <a:lnRef idx="1">
-            <a:schemeClr val="dk1"/>
-          </a:lnRef>
-          <a:fillRef idx="0">
-            <a:schemeClr val="dk1"/>
-          </a:fillRef>
-          <a:effectRef idx="0">
-            <a:schemeClr val="dk1"/>
-          </a:effectRef>
-          <a:fontRef idx="minor">
-            <a:schemeClr val="tx1"/>
-          </a:fontRef>
-        </p:style>
-      </p:cxnSp>
-      <p:cxnSp>
-        <p:nvCxnSpPr>
-          <p:cNvPr id="122" name="Straight Connector 121"/>
-          <p:cNvCxnSpPr/>
-          <p:nvPr/>
-        </p:nvCxnSpPr>
-        <p:spPr>
-          <a:xfrm flipH="1">
-            <a:off x="2555776" y="2780928"/>
-            <a:ext cx="288032" cy="0"/>
-          </a:xfrm>
-          <a:prstGeom prst="line">
-            <a:avLst/>
-          </a:prstGeom>
-          <a:ln w="12700"/>
-        </p:spPr>
-        <p:style>
-          <a:lnRef idx="1">
-            <a:schemeClr val="dk1"/>
-          </a:lnRef>
-          <a:fillRef idx="0">
-            <a:schemeClr val="dk1"/>
-          </a:fillRef>
-          <a:effectRef idx="0">
-            <a:schemeClr val="dk1"/>
-          </a:effectRef>
-          <a:fontRef idx="minor">
-            <a:schemeClr val="tx1"/>
-          </a:fontRef>
-        </p:style>
-      </p:cxnSp>
-      <p:cxnSp>
-        <p:nvCxnSpPr>
-          <p:cNvPr id="123" name="Straight Connector 122"/>
-          <p:cNvCxnSpPr/>
-          <p:nvPr/>
-        </p:nvCxnSpPr>
-        <p:spPr>
-          <a:xfrm flipH="1">
-            <a:off x="2483768" y="2564904"/>
-            <a:ext cx="216024" cy="0"/>
-          </a:xfrm>
-          <a:prstGeom prst="line">
-            <a:avLst/>
-          </a:prstGeom>
-          <a:ln w="12700"/>
-        </p:spPr>
-        <p:style>
-          <a:lnRef idx="1">
-            <a:schemeClr val="dk1"/>
-          </a:lnRef>
-          <a:fillRef idx="0">
-            <a:schemeClr val="dk1"/>
-          </a:fillRef>
-          <a:effectRef idx="0">
-            <a:schemeClr val="dk1"/>
-          </a:effectRef>
-          <a:fontRef idx="minor">
-            <a:schemeClr val="tx1"/>
-          </a:fontRef>
-        </p:style>
-      </p:cxnSp>
-      <p:cxnSp>
-        <p:nvCxnSpPr>
-          <p:cNvPr id="124" name="Straight Connector 123"/>
-          <p:cNvCxnSpPr/>
-          <p:nvPr/>
-        </p:nvCxnSpPr>
-        <p:spPr>
-          <a:xfrm>
-            <a:off x="2699792" y="3284984"/>
-            <a:ext cx="0" cy="144016"/>
-          </a:xfrm>
-          <a:prstGeom prst="line">
-            <a:avLst/>
-          </a:prstGeom>
-          <a:ln w="12700"/>
-        </p:spPr>
-        <p:style>
-          <a:lnRef idx="1">
-            <a:schemeClr val="dk1"/>
-          </a:lnRef>
-          <a:fillRef idx="0">
-            <a:schemeClr val="dk1"/>
-          </a:fillRef>
-          <a:effectRef idx="0">
-            <a:schemeClr val="dk1"/>
-          </a:effectRef>
-          <a:fontRef idx="minor">
-            <a:schemeClr val="tx1"/>
-          </a:fontRef>
-        </p:style>
-      </p:cxnSp>
-      <p:cxnSp>
-        <p:nvCxnSpPr>
-          <p:cNvPr id="125" name="Straight Connector 124"/>
-          <p:cNvCxnSpPr/>
-          <p:nvPr/>
-        </p:nvCxnSpPr>
-        <p:spPr>
-          <a:xfrm flipH="1">
-            <a:off x="2483768" y="3429000"/>
-            <a:ext cx="432048" cy="0"/>
-          </a:xfrm>
-          <a:prstGeom prst="line">
-            <a:avLst/>
-          </a:prstGeom>
-          <a:ln w="12700"/>
-        </p:spPr>
-        <p:style>
-          <a:lnRef idx="1">
-            <a:schemeClr val="dk1"/>
-          </a:lnRef>
-          <a:fillRef idx="0">
-            <a:schemeClr val="dk1"/>
-          </a:fillRef>
-          <a:effectRef idx="0">
-            <a:schemeClr val="dk1"/>
-          </a:effectRef>
-          <a:fontRef idx="minor">
-            <a:schemeClr val="tx1"/>
-          </a:fontRef>
-        </p:style>
-      </p:cxnSp>
-      <p:cxnSp>
-        <p:nvCxnSpPr>
-          <p:cNvPr id="126" name="Straight Connector 125"/>
-          <p:cNvCxnSpPr/>
-          <p:nvPr/>
-        </p:nvCxnSpPr>
-        <p:spPr>
-          <a:xfrm flipH="1">
-            <a:off x="2555776" y="3501008"/>
-            <a:ext cx="288032" cy="0"/>
-          </a:xfrm>
-          <a:prstGeom prst="line">
-            <a:avLst/>
-          </a:prstGeom>
-          <a:ln w="12700"/>
-        </p:spPr>
-        <p:style>
-          <a:lnRef idx="1">
-            <a:schemeClr val="dk1"/>
-          </a:lnRef>
-          <a:fillRef idx="0">
-            <a:schemeClr val="dk1"/>
-          </a:fillRef>
-          <a:effectRef idx="0">
-            <a:schemeClr val="dk1"/>
-          </a:effectRef>
-          <a:fontRef idx="minor">
-            <a:schemeClr val="tx1"/>
-          </a:fontRef>
-        </p:style>
-      </p:cxnSp>
-      <p:cxnSp>
-        <p:nvCxnSpPr>
-          <p:cNvPr id="127" name="Straight Connector 126"/>
-          <p:cNvCxnSpPr/>
-          <p:nvPr/>
-        </p:nvCxnSpPr>
-        <p:spPr>
-          <a:xfrm flipH="1">
-            <a:off x="2483768" y="3284984"/>
-            <a:ext cx="216024" cy="0"/>
-          </a:xfrm>
-          <a:prstGeom prst="line">
-            <a:avLst/>
-          </a:prstGeom>
-          <a:ln w="12700"/>
-        </p:spPr>
-        <p:style>
-          <a:lnRef idx="1">
-            <a:schemeClr val="dk1"/>
-          </a:lnRef>
-          <a:fillRef idx="0">
-            <a:schemeClr val="dk1"/>
-          </a:fillRef>
-          <a:effectRef idx="0">
-            <a:schemeClr val="dk1"/>
-          </a:effectRef>
-          <a:fontRef idx="minor">
-            <a:schemeClr val="tx1"/>
-          </a:fontRef>
-        </p:style>
-      </p:cxnSp>
-      <p:cxnSp>
-        <p:nvCxnSpPr>
-          <p:cNvPr id="128" name="Straight Connector 127"/>
-          <p:cNvCxnSpPr/>
-          <p:nvPr/>
-        </p:nvCxnSpPr>
-        <p:spPr>
-          <a:xfrm>
-            <a:off x="2699792" y="3645024"/>
-            <a:ext cx="0" cy="144016"/>
-          </a:xfrm>
-          <a:prstGeom prst="line">
-            <a:avLst/>
-          </a:prstGeom>
-          <a:ln w="12700"/>
-        </p:spPr>
-        <p:style>
-          <a:lnRef idx="1">
-            <a:schemeClr val="dk1"/>
-          </a:lnRef>
-          <a:fillRef idx="0">
-            <a:schemeClr val="dk1"/>
-          </a:fillRef>
-          <a:effectRef idx="0">
-            <a:schemeClr val="dk1"/>
-          </a:effectRef>
-          <a:fontRef idx="minor">
-            <a:schemeClr val="tx1"/>
-          </a:fontRef>
-        </p:style>
-      </p:cxnSp>
-      <p:cxnSp>
-        <p:nvCxnSpPr>
-          <p:cNvPr id="129" name="Straight Connector 128"/>
-          <p:cNvCxnSpPr/>
-          <p:nvPr/>
-        </p:nvCxnSpPr>
-        <p:spPr>
-          <a:xfrm flipH="1">
-            <a:off x="2483768" y="3789040"/>
-            <a:ext cx="432048" cy="0"/>
-          </a:xfrm>
-          <a:prstGeom prst="line">
-            <a:avLst/>
-          </a:prstGeom>
-          <a:ln w="12700"/>
-        </p:spPr>
-        <p:style>
-          <a:lnRef idx="1">
-            <a:schemeClr val="dk1"/>
-          </a:lnRef>
-          <a:fillRef idx="0">
-            <a:schemeClr val="dk1"/>
-          </a:fillRef>
-          <a:effectRef idx="0">
-            <a:schemeClr val="dk1"/>
-          </a:effectRef>
-          <a:fontRef idx="minor">
-            <a:schemeClr val="tx1"/>
-          </a:fontRef>
-        </p:style>
-      </p:cxnSp>
-      <p:cxnSp>
-        <p:nvCxnSpPr>
-          <p:cNvPr id="130" name="Straight Connector 129"/>
-          <p:cNvCxnSpPr/>
-          <p:nvPr/>
-        </p:nvCxnSpPr>
-        <p:spPr>
-          <a:xfrm flipH="1">
-            <a:off x="2555776" y="3861048"/>
-            <a:ext cx="288032" cy="0"/>
-          </a:xfrm>
-          <a:prstGeom prst="line">
-            <a:avLst/>
-          </a:prstGeom>
-          <a:ln w="12700"/>
-        </p:spPr>
-        <p:style>
-          <a:lnRef idx="1">
-            <a:schemeClr val="dk1"/>
-          </a:lnRef>
-          <a:fillRef idx="0">
-            <a:schemeClr val="dk1"/>
-          </a:fillRef>
-          <a:effectRef idx="0">
-            <a:schemeClr val="dk1"/>
-          </a:effectRef>
-          <a:fontRef idx="minor">
-            <a:schemeClr val="tx1"/>
-          </a:fontRef>
-        </p:style>
-      </p:cxnSp>
-      <p:cxnSp>
-        <p:nvCxnSpPr>
-          <p:cNvPr id="131" name="Straight Connector 130"/>
-          <p:cNvCxnSpPr/>
-          <p:nvPr/>
-        </p:nvCxnSpPr>
-        <p:spPr>
-          <a:xfrm flipH="1">
-            <a:off x="2483768" y="3645024"/>
-            <a:ext cx="216024" cy="0"/>
-          </a:xfrm>
-          <a:prstGeom prst="line">
-            <a:avLst/>
-          </a:prstGeom>
-          <a:ln w="12700"/>
-        </p:spPr>
-        <p:style>
-          <a:lnRef idx="1">
-            <a:schemeClr val="dk1"/>
-          </a:lnRef>
-          <a:fillRef idx="0">
-            <a:schemeClr val="dk1"/>
-          </a:fillRef>
-          <a:effectRef idx="0">
-            <a:schemeClr val="dk1"/>
-          </a:effectRef>
-          <a:fontRef idx="minor">
-            <a:schemeClr val="tx1"/>
-          </a:fontRef>
-        </p:style>
-      </p:cxnSp>
-      <p:cxnSp>
-        <p:nvCxnSpPr>
-          <p:cNvPr id="132" name="Straight Connector 131"/>
-          <p:cNvCxnSpPr/>
-          <p:nvPr/>
-        </p:nvCxnSpPr>
-        <p:spPr>
-          <a:xfrm>
-            <a:off x="2699792" y="4005064"/>
-            <a:ext cx="0" cy="144016"/>
-          </a:xfrm>
-          <a:prstGeom prst="line">
-            <a:avLst/>
-          </a:prstGeom>
-          <a:ln w="12700"/>
-        </p:spPr>
-        <p:style>
-          <a:lnRef idx="1">
-            <a:schemeClr val="dk1"/>
-          </a:lnRef>
-          <a:fillRef idx="0">
-            <a:schemeClr val="dk1"/>
-          </a:fillRef>
-          <a:effectRef idx="0">
-            <a:schemeClr val="dk1"/>
-          </a:effectRef>
-          <a:fontRef idx="minor">
-            <a:schemeClr val="tx1"/>
-          </a:fontRef>
-        </p:style>
-      </p:cxnSp>
-      <p:cxnSp>
-        <p:nvCxnSpPr>
-          <p:cNvPr id="133" name="Straight Connector 132"/>
-          <p:cNvCxnSpPr/>
-          <p:nvPr/>
-        </p:nvCxnSpPr>
-        <p:spPr>
-          <a:xfrm flipH="1">
-            <a:off x="2483768" y="4149080"/>
-            <a:ext cx="432048" cy="0"/>
-          </a:xfrm>
-          <a:prstGeom prst="line">
-            <a:avLst/>
-          </a:prstGeom>
-          <a:ln w="12700"/>
-        </p:spPr>
-        <p:style>
-          <a:lnRef idx="1">
-            <a:schemeClr val="dk1"/>
-          </a:lnRef>
-          <a:fillRef idx="0">
-            <a:schemeClr val="dk1"/>
-          </a:fillRef>
-          <a:effectRef idx="0">
-            <a:schemeClr val="dk1"/>
-          </a:effectRef>
-          <a:fontRef idx="minor">
-            <a:schemeClr val="tx1"/>
-          </a:fontRef>
-        </p:style>
-      </p:cxnSp>
-      <p:cxnSp>
-        <p:nvCxnSpPr>
-          <p:cNvPr id="134" name="Straight Connector 133"/>
-          <p:cNvCxnSpPr/>
-          <p:nvPr/>
-        </p:nvCxnSpPr>
-        <p:spPr>
-          <a:xfrm flipH="1">
-            <a:off x="2555776" y="4221088"/>
-            <a:ext cx="288032" cy="0"/>
-          </a:xfrm>
-          <a:prstGeom prst="line">
-            <a:avLst/>
-          </a:prstGeom>
-          <a:ln w="12700"/>
-        </p:spPr>
-        <p:style>
-          <a:lnRef idx="1">
-            <a:schemeClr val="dk1"/>
-          </a:lnRef>
-          <a:fillRef idx="0">
-            <a:schemeClr val="dk1"/>
-          </a:fillRef>
-          <a:effectRef idx="0">
-            <a:schemeClr val="dk1"/>
-          </a:effectRef>
-          <a:fontRef idx="minor">
-            <a:schemeClr val="tx1"/>
-          </a:fontRef>
-        </p:style>
-      </p:cxnSp>
-      <p:cxnSp>
-        <p:nvCxnSpPr>
-          <p:cNvPr id="135" name="Straight Connector 134"/>
-          <p:cNvCxnSpPr/>
-          <p:nvPr/>
-        </p:nvCxnSpPr>
-        <p:spPr>
-          <a:xfrm flipH="1">
-            <a:off x="2483768" y="4005064"/>
-            <a:ext cx="216024" cy="0"/>
-          </a:xfrm>
-          <a:prstGeom prst="line">
-            <a:avLst/>
-          </a:prstGeom>
-          <a:ln w="12700"/>
+            <a:off x="2555776" y="4005063"/>
+            <a:ext cx="4032448" cy="360041"/>
+          </a:xfrm>
+          <a:prstGeom prst="straightConnector1">
+            <a:avLst/>
+          </a:prstGeom>
+          <a:ln w="12700">
+            <a:tailEnd type="arrow"/>
+          </a:ln>
         </p:spPr>
         <p:style>
           <a:lnRef idx="1">

</xml_diff>

<commit_message>
Evaluation part beginning + figures
</commit_message>
<xml_diff>
--- a/paper/figures/figures.pptx
+++ b/paper/figures/figures.pptx
@@ -293,7 +293,7 @@
             <a:fld id="{4E7438E1-117D-44FB-AC24-B79D899BA877}" type="datetimeFigureOut">
               <a:rPr lang="he-IL" smtClean="0"/>
               <a:pPr/>
-              <a:t>ד'/שבט/תשע"ב</a:t>
+              <a:t>ה'/שבט/תשע"ב</a:t>
             </a:fld>
             <a:endParaRPr lang="he-IL"/>
           </a:p>
@@ -460,7 +460,7 @@
             <a:fld id="{4E7438E1-117D-44FB-AC24-B79D899BA877}" type="datetimeFigureOut">
               <a:rPr lang="he-IL" smtClean="0"/>
               <a:pPr/>
-              <a:t>ד'/שבט/תשע"ב</a:t>
+              <a:t>ה'/שבט/תשע"ב</a:t>
             </a:fld>
             <a:endParaRPr lang="he-IL"/>
           </a:p>
@@ -637,7 +637,7 @@
             <a:fld id="{4E7438E1-117D-44FB-AC24-B79D899BA877}" type="datetimeFigureOut">
               <a:rPr lang="he-IL" smtClean="0"/>
               <a:pPr/>
-              <a:t>ד'/שבט/תשע"ב</a:t>
+              <a:t>ה'/שבט/תשע"ב</a:t>
             </a:fld>
             <a:endParaRPr lang="he-IL"/>
           </a:p>
@@ -804,7 +804,7 @@
             <a:fld id="{4E7438E1-117D-44FB-AC24-B79D899BA877}" type="datetimeFigureOut">
               <a:rPr lang="he-IL" smtClean="0"/>
               <a:pPr/>
-              <a:t>ד'/שבט/תשע"ב</a:t>
+              <a:t>ה'/שבט/תשע"ב</a:t>
             </a:fld>
             <a:endParaRPr lang="he-IL"/>
           </a:p>
@@ -1047,7 +1047,7 @@
             <a:fld id="{4E7438E1-117D-44FB-AC24-B79D899BA877}" type="datetimeFigureOut">
               <a:rPr lang="he-IL" smtClean="0"/>
               <a:pPr/>
-              <a:t>ד'/שבט/תשע"ב</a:t>
+              <a:t>ה'/שבט/תשע"ב</a:t>
             </a:fld>
             <a:endParaRPr lang="he-IL"/>
           </a:p>
@@ -1332,7 +1332,7 @@
             <a:fld id="{4E7438E1-117D-44FB-AC24-B79D899BA877}" type="datetimeFigureOut">
               <a:rPr lang="he-IL" smtClean="0"/>
               <a:pPr/>
-              <a:t>ד'/שבט/תשע"ב</a:t>
+              <a:t>ה'/שבט/תשע"ב</a:t>
             </a:fld>
             <a:endParaRPr lang="he-IL"/>
           </a:p>
@@ -1751,7 +1751,7 @@
             <a:fld id="{4E7438E1-117D-44FB-AC24-B79D899BA877}" type="datetimeFigureOut">
               <a:rPr lang="he-IL" smtClean="0"/>
               <a:pPr/>
-              <a:t>ד'/שבט/תשע"ב</a:t>
+              <a:t>ה'/שבט/תשע"ב</a:t>
             </a:fld>
             <a:endParaRPr lang="he-IL"/>
           </a:p>
@@ -1866,7 +1866,7 @@
             <a:fld id="{4E7438E1-117D-44FB-AC24-B79D899BA877}" type="datetimeFigureOut">
               <a:rPr lang="he-IL" smtClean="0"/>
               <a:pPr/>
-              <a:t>ד'/שבט/תשע"ב</a:t>
+              <a:t>ה'/שבט/תשע"ב</a:t>
             </a:fld>
             <a:endParaRPr lang="he-IL"/>
           </a:p>
@@ -1958,7 +1958,7 @@
             <a:fld id="{4E7438E1-117D-44FB-AC24-B79D899BA877}" type="datetimeFigureOut">
               <a:rPr lang="he-IL" smtClean="0"/>
               <a:pPr/>
-              <a:t>ד'/שבט/תשע"ב</a:t>
+              <a:t>ה'/שבט/תשע"ב</a:t>
             </a:fld>
             <a:endParaRPr lang="he-IL"/>
           </a:p>
@@ -2232,7 +2232,7 @@
             <a:fld id="{4E7438E1-117D-44FB-AC24-B79D899BA877}" type="datetimeFigureOut">
               <a:rPr lang="he-IL" smtClean="0"/>
               <a:pPr/>
-              <a:t>ד'/שבט/תשע"ב</a:t>
+              <a:t>ה'/שבט/תשע"ב</a:t>
             </a:fld>
             <a:endParaRPr lang="he-IL"/>
           </a:p>
@@ -2482,7 +2482,7 @@
             <a:fld id="{4E7438E1-117D-44FB-AC24-B79D899BA877}" type="datetimeFigureOut">
               <a:rPr lang="he-IL" smtClean="0"/>
               <a:pPr/>
-              <a:t>ד'/שבט/תשע"ב</a:t>
+              <a:t>ה'/שבט/תשע"ב</a:t>
             </a:fld>
             <a:endParaRPr lang="he-IL"/>
           </a:p>
@@ -2692,7 +2692,7 @@
             <a:fld id="{4E7438E1-117D-44FB-AC24-B79D899BA877}" type="datetimeFigureOut">
               <a:rPr lang="he-IL" smtClean="0"/>
               <a:pPr/>
-              <a:t>ד'/שבט/תשע"ב</a:t>
+              <a:t>ה'/שבט/תשע"ב</a:t>
             </a:fld>
             <a:endParaRPr lang="he-IL"/>
           </a:p>
@@ -8454,6 +8454,516 @@
           </a:p>
         </p:txBody>
       </p:sp>
+      <p:grpSp>
+        <p:nvGrpSpPr>
+          <p:cNvPr id="143" name="Group 142"/>
+          <p:cNvGrpSpPr/>
+          <p:nvPr/>
+        </p:nvGrpSpPr>
+        <p:grpSpPr>
+          <a:xfrm>
+            <a:off x="5652120" y="2564904"/>
+            <a:ext cx="216024" cy="1141095"/>
+            <a:chOff x="5652120" y="2564904"/>
+            <a:chExt cx="216024" cy="1141095"/>
+          </a:xfrm>
+        </p:grpSpPr>
+        <p:sp>
+          <p:nvSpPr>
+            <p:cNvPr id="98" name="TextBox 97"/>
+            <p:cNvSpPr txBox="1"/>
+            <p:nvPr/>
+          </p:nvSpPr>
+          <p:spPr>
+            <a:xfrm>
+              <a:off x="5652120" y="2564904"/>
+              <a:ext cx="216024" cy="276999"/>
+            </a:xfrm>
+            <a:prstGeom prst="rect">
+              <a:avLst/>
+            </a:prstGeom>
+            <a:noFill/>
+          </p:spPr>
+          <p:txBody>
+            <a:bodyPr wrap="square" rtlCol="0">
+              <a:spAutoFit/>
+            </a:bodyPr>
+            <a:lstStyle/>
+            <a:p>
+              <a:pPr algn="l" rtl="0"/>
+              <a:r>
+                <a:rPr lang="en-US" sz="1200" dirty="0" smtClean="0"/>
+                <a:t>0</a:t>
+              </a:r>
+              <a:endParaRPr lang="en-US" sz="1600" dirty="0"/>
+            </a:p>
+          </p:txBody>
+        </p:sp>
+        <p:sp>
+          <p:nvSpPr>
+            <p:cNvPr id="103" name="TextBox 102"/>
+            <p:cNvSpPr txBox="1"/>
+            <p:nvPr/>
+          </p:nvSpPr>
+          <p:spPr>
+            <a:xfrm>
+              <a:off x="5652120" y="2780928"/>
+              <a:ext cx="216024" cy="276999"/>
+            </a:xfrm>
+            <a:prstGeom prst="rect">
+              <a:avLst/>
+            </a:prstGeom>
+            <a:noFill/>
+          </p:spPr>
+          <p:txBody>
+            <a:bodyPr wrap="square" rtlCol="0">
+              <a:spAutoFit/>
+            </a:bodyPr>
+            <a:lstStyle/>
+            <a:p>
+              <a:pPr algn="l" rtl="0"/>
+              <a:r>
+                <a:rPr lang="en-US" sz="1200" dirty="0" smtClean="0"/>
+                <a:t>1</a:t>
+              </a:r>
+              <a:endParaRPr lang="en-US" sz="1600" dirty="0"/>
+            </a:p>
+          </p:txBody>
+        </p:sp>
+        <p:sp>
+          <p:nvSpPr>
+            <p:cNvPr id="137" name="TextBox 136"/>
+            <p:cNvSpPr txBox="1"/>
+            <p:nvPr/>
+          </p:nvSpPr>
+          <p:spPr>
+            <a:xfrm>
+              <a:off x="5652120" y="2996952"/>
+              <a:ext cx="216024" cy="276999"/>
+            </a:xfrm>
+            <a:prstGeom prst="rect">
+              <a:avLst/>
+            </a:prstGeom>
+            <a:noFill/>
+          </p:spPr>
+          <p:txBody>
+            <a:bodyPr wrap="square" rtlCol="0">
+              <a:spAutoFit/>
+            </a:bodyPr>
+            <a:lstStyle/>
+            <a:p>
+              <a:pPr algn="l" rtl="0"/>
+              <a:r>
+                <a:rPr lang="en-US" sz="1200" dirty="0" smtClean="0"/>
+                <a:t>2</a:t>
+              </a:r>
+              <a:endParaRPr lang="en-US" sz="1600" dirty="0"/>
+            </a:p>
+          </p:txBody>
+        </p:sp>
+        <p:sp>
+          <p:nvSpPr>
+            <p:cNvPr id="139" name="TextBox 138"/>
+            <p:cNvSpPr txBox="1"/>
+            <p:nvPr/>
+          </p:nvSpPr>
+          <p:spPr>
+            <a:xfrm>
+              <a:off x="5652120" y="3212976"/>
+              <a:ext cx="216024" cy="276999"/>
+            </a:xfrm>
+            <a:prstGeom prst="rect">
+              <a:avLst/>
+            </a:prstGeom>
+            <a:noFill/>
+          </p:spPr>
+          <p:txBody>
+            <a:bodyPr wrap="square" rtlCol="0">
+              <a:spAutoFit/>
+            </a:bodyPr>
+            <a:lstStyle/>
+            <a:p>
+              <a:pPr algn="l" rtl="0"/>
+              <a:r>
+                <a:rPr lang="en-US" sz="1200" dirty="0" smtClean="0"/>
+                <a:t>3</a:t>
+              </a:r>
+              <a:endParaRPr lang="en-US" sz="1600" dirty="0"/>
+            </a:p>
+          </p:txBody>
+        </p:sp>
+        <p:sp>
+          <p:nvSpPr>
+            <p:cNvPr id="140" name="TextBox 139"/>
+            <p:cNvSpPr txBox="1"/>
+            <p:nvPr/>
+          </p:nvSpPr>
+          <p:spPr>
+            <a:xfrm>
+              <a:off x="5652120" y="3429000"/>
+              <a:ext cx="216024" cy="276999"/>
+            </a:xfrm>
+            <a:prstGeom prst="rect">
+              <a:avLst/>
+            </a:prstGeom>
+            <a:noFill/>
+          </p:spPr>
+          <p:txBody>
+            <a:bodyPr wrap="square" rtlCol="0">
+              <a:spAutoFit/>
+            </a:bodyPr>
+            <a:lstStyle/>
+            <a:p>
+              <a:pPr algn="l" rtl="0"/>
+              <a:r>
+                <a:rPr lang="en-US" sz="1200" dirty="0" smtClean="0"/>
+                <a:t>4</a:t>
+              </a:r>
+              <a:endParaRPr lang="en-US" sz="1600" dirty="0"/>
+            </a:p>
+          </p:txBody>
+        </p:sp>
+      </p:grpSp>
+      <p:grpSp>
+        <p:nvGrpSpPr>
+          <p:cNvPr id="144" name="Group 143"/>
+          <p:cNvGrpSpPr/>
+          <p:nvPr/>
+        </p:nvGrpSpPr>
+        <p:grpSpPr>
+          <a:xfrm>
+            <a:off x="4211960" y="2564904"/>
+            <a:ext cx="216024" cy="1141095"/>
+            <a:chOff x="5652120" y="2564904"/>
+            <a:chExt cx="216024" cy="1141095"/>
+          </a:xfrm>
+        </p:grpSpPr>
+        <p:sp>
+          <p:nvSpPr>
+            <p:cNvPr id="145" name="TextBox 144"/>
+            <p:cNvSpPr txBox="1"/>
+            <p:nvPr/>
+          </p:nvSpPr>
+          <p:spPr>
+            <a:xfrm>
+              <a:off x="5652120" y="2564904"/>
+              <a:ext cx="216024" cy="276999"/>
+            </a:xfrm>
+            <a:prstGeom prst="rect">
+              <a:avLst/>
+            </a:prstGeom>
+            <a:noFill/>
+          </p:spPr>
+          <p:txBody>
+            <a:bodyPr wrap="square" rtlCol="0">
+              <a:spAutoFit/>
+            </a:bodyPr>
+            <a:lstStyle/>
+            <a:p>
+              <a:pPr algn="l" rtl="0"/>
+              <a:r>
+                <a:rPr lang="en-US" sz="1200" dirty="0" smtClean="0"/>
+                <a:t>0</a:t>
+              </a:r>
+              <a:endParaRPr lang="en-US" sz="1600" dirty="0"/>
+            </a:p>
+          </p:txBody>
+        </p:sp>
+        <p:sp>
+          <p:nvSpPr>
+            <p:cNvPr id="146" name="TextBox 145"/>
+            <p:cNvSpPr txBox="1"/>
+            <p:nvPr/>
+          </p:nvSpPr>
+          <p:spPr>
+            <a:xfrm>
+              <a:off x="5652120" y="2780928"/>
+              <a:ext cx="216024" cy="276999"/>
+            </a:xfrm>
+            <a:prstGeom prst="rect">
+              <a:avLst/>
+            </a:prstGeom>
+            <a:noFill/>
+          </p:spPr>
+          <p:txBody>
+            <a:bodyPr wrap="square" rtlCol="0">
+              <a:spAutoFit/>
+            </a:bodyPr>
+            <a:lstStyle/>
+            <a:p>
+              <a:pPr algn="l" rtl="0"/>
+              <a:r>
+                <a:rPr lang="en-US" sz="1200" dirty="0" smtClean="0"/>
+                <a:t>1</a:t>
+              </a:r>
+              <a:endParaRPr lang="en-US" sz="1600" dirty="0"/>
+            </a:p>
+          </p:txBody>
+        </p:sp>
+        <p:sp>
+          <p:nvSpPr>
+            <p:cNvPr id="147" name="TextBox 146"/>
+            <p:cNvSpPr txBox="1"/>
+            <p:nvPr/>
+          </p:nvSpPr>
+          <p:spPr>
+            <a:xfrm>
+              <a:off x="5652120" y="2996952"/>
+              <a:ext cx="216024" cy="276999"/>
+            </a:xfrm>
+            <a:prstGeom prst="rect">
+              <a:avLst/>
+            </a:prstGeom>
+            <a:noFill/>
+          </p:spPr>
+          <p:txBody>
+            <a:bodyPr wrap="square" rtlCol="0">
+              <a:spAutoFit/>
+            </a:bodyPr>
+            <a:lstStyle/>
+            <a:p>
+              <a:pPr algn="l" rtl="0"/>
+              <a:r>
+                <a:rPr lang="en-US" sz="1200" dirty="0" smtClean="0"/>
+                <a:t>2</a:t>
+              </a:r>
+              <a:endParaRPr lang="en-US" sz="1600" dirty="0"/>
+            </a:p>
+          </p:txBody>
+        </p:sp>
+        <p:sp>
+          <p:nvSpPr>
+            <p:cNvPr id="148" name="TextBox 147"/>
+            <p:cNvSpPr txBox="1"/>
+            <p:nvPr/>
+          </p:nvSpPr>
+          <p:spPr>
+            <a:xfrm>
+              <a:off x="5652120" y="3212976"/>
+              <a:ext cx="216024" cy="276999"/>
+            </a:xfrm>
+            <a:prstGeom prst="rect">
+              <a:avLst/>
+            </a:prstGeom>
+            <a:noFill/>
+          </p:spPr>
+          <p:txBody>
+            <a:bodyPr wrap="square" rtlCol="0">
+              <a:spAutoFit/>
+            </a:bodyPr>
+            <a:lstStyle/>
+            <a:p>
+              <a:pPr algn="l" rtl="0"/>
+              <a:r>
+                <a:rPr lang="en-US" sz="1200" dirty="0" smtClean="0"/>
+                <a:t>3</a:t>
+              </a:r>
+              <a:endParaRPr lang="en-US" sz="1600" dirty="0"/>
+            </a:p>
+          </p:txBody>
+        </p:sp>
+        <p:sp>
+          <p:nvSpPr>
+            <p:cNvPr id="149" name="TextBox 148"/>
+            <p:cNvSpPr txBox="1"/>
+            <p:nvPr/>
+          </p:nvSpPr>
+          <p:spPr>
+            <a:xfrm>
+              <a:off x="5652120" y="3429000"/>
+              <a:ext cx="216024" cy="276999"/>
+            </a:xfrm>
+            <a:prstGeom prst="rect">
+              <a:avLst/>
+            </a:prstGeom>
+            <a:noFill/>
+          </p:spPr>
+          <p:txBody>
+            <a:bodyPr wrap="square" rtlCol="0">
+              <a:spAutoFit/>
+            </a:bodyPr>
+            <a:lstStyle/>
+            <a:p>
+              <a:pPr algn="l" rtl="0"/>
+              <a:r>
+                <a:rPr lang="en-US" sz="1200" dirty="0" smtClean="0"/>
+                <a:t>4</a:t>
+              </a:r>
+              <a:endParaRPr lang="en-US" sz="1600" dirty="0"/>
+            </a:p>
+          </p:txBody>
+        </p:sp>
+      </p:grpSp>
+      <p:grpSp>
+        <p:nvGrpSpPr>
+          <p:cNvPr id="150" name="Group 149"/>
+          <p:cNvGrpSpPr/>
+          <p:nvPr/>
+        </p:nvGrpSpPr>
+        <p:grpSpPr>
+          <a:xfrm>
+            <a:off x="2771800" y="3645024"/>
+            <a:ext cx="216024" cy="1141095"/>
+            <a:chOff x="5652120" y="2564904"/>
+            <a:chExt cx="216024" cy="1141095"/>
+          </a:xfrm>
+        </p:grpSpPr>
+        <p:sp>
+          <p:nvSpPr>
+            <p:cNvPr id="151" name="TextBox 150"/>
+            <p:cNvSpPr txBox="1"/>
+            <p:nvPr/>
+          </p:nvSpPr>
+          <p:spPr>
+            <a:xfrm>
+              <a:off x="5652120" y="2564904"/>
+              <a:ext cx="216024" cy="276999"/>
+            </a:xfrm>
+            <a:prstGeom prst="rect">
+              <a:avLst/>
+            </a:prstGeom>
+            <a:noFill/>
+          </p:spPr>
+          <p:txBody>
+            <a:bodyPr wrap="square" rtlCol="0">
+              <a:spAutoFit/>
+            </a:bodyPr>
+            <a:lstStyle/>
+            <a:p>
+              <a:pPr algn="l" rtl="0"/>
+              <a:r>
+                <a:rPr lang="en-US" sz="1200" dirty="0" smtClean="0"/>
+                <a:t>0</a:t>
+              </a:r>
+              <a:endParaRPr lang="en-US" sz="1600" dirty="0"/>
+            </a:p>
+          </p:txBody>
+        </p:sp>
+        <p:sp>
+          <p:nvSpPr>
+            <p:cNvPr id="152" name="TextBox 151"/>
+            <p:cNvSpPr txBox="1"/>
+            <p:nvPr/>
+          </p:nvSpPr>
+          <p:spPr>
+            <a:xfrm>
+              <a:off x="5652120" y="2780928"/>
+              <a:ext cx="216024" cy="276999"/>
+            </a:xfrm>
+            <a:prstGeom prst="rect">
+              <a:avLst/>
+            </a:prstGeom>
+            <a:noFill/>
+          </p:spPr>
+          <p:txBody>
+            <a:bodyPr wrap="square" rtlCol="0">
+              <a:spAutoFit/>
+            </a:bodyPr>
+            <a:lstStyle/>
+            <a:p>
+              <a:pPr algn="l" rtl="0"/>
+              <a:r>
+                <a:rPr lang="en-US" sz="1200" dirty="0" smtClean="0"/>
+                <a:t>1</a:t>
+              </a:r>
+              <a:endParaRPr lang="en-US" sz="1600" dirty="0"/>
+            </a:p>
+          </p:txBody>
+        </p:sp>
+        <p:sp>
+          <p:nvSpPr>
+            <p:cNvPr id="153" name="TextBox 152"/>
+            <p:cNvSpPr txBox="1"/>
+            <p:nvPr/>
+          </p:nvSpPr>
+          <p:spPr>
+            <a:xfrm>
+              <a:off x="5652120" y="2996952"/>
+              <a:ext cx="216024" cy="276999"/>
+            </a:xfrm>
+            <a:prstGeom prst="rect">
+              <a:avLst/>
+            </a:prstGeom>
+            <a:noFill/>
+          </p:spPr>
+          <p:txBody>
+            <a:bodyPr wrap="square" rtlCol="0">
+              <a:spAutoFit/>
+            </a:bodyPr>
+            <a:lstStyle/>
+            <a:p>
+              <a:pPr algn="l" rtl="0"/>
+              <a:r>
+                <a:rPr lang="en-US" sz="1200" dirty="0" smtClean="0"/>
+                <a:t>2</a:t>
+              </a:r>
+              <a:endParaRPr lang="en-US" sz="1600" dirty="0"/>
+            </a:p>
+          </p:txBody>
+        </p:sp>
+        <p:sp>
+          <p:nvSpPr>
+            <p:cNvPr id="154" name="TextBox 153"/>
+            <p:cNvSpPr txBox="1"/>
+            <p:nvPr/>
+          </p:nvSpPr>
+          <p:spPr>
+            <a:xfrm>
+              <a:off x="5652120" y="3212976"/>
+              <a:ext cx="216024" cy="276999"/>
+            </a:xfrm>
+            <a:prstGeom prst="rect">
+              <a:avLst/>
+            </a:prstGeom>
+            <a:noFill/>
+          </p:spPr>
+          <p:txBody>
+            <a:bodyPr wrap="square" rtlCol="0">
+              <a:spAutoFit/>
+            </a:bodyPr>
+            <a:lstStyle/>
+            <a:p>
+              <a:pPr algn="l" rtl="0"/>
+              <a:r>
+                <a:rPr lang="en-US" sz="1200" dirty="0" smtClean="0"/>
+                <a:t>3</a:t>
+              </a:r>
+              <a:endParaRPr lang="en-US" sz="1600" dirty="0"/>
+            </a:p>
+          </p:txBody>
+        </p:sp>
+        <p:sp>
+          <p:nvSpPr>
+            <p:cNvPr id="155" name="TextBox 154"/>
+            <p:cNvSpPr txBox="1"/>
+            <p:nvPr/>
+          </p:nvSpPr>
+          <p:spPr>
+            <a:xfrm>
+              <a:off x="5652120" y="3429000"/>
+              <a:ext cx="216024" cy="276999"/>
+            </a:xfrm>
+            <a:prstGeom prst="rect">
+              <a:avLst/>
+            </a:prstGeom>
+            <a:noFill/>
+          </p:spPr>
+          <p:txBody>
+            <a:bodyPr wrap="square" rtlCol="0">
+              <a:spAutoFit/>
+            </a:bodyPr>
+            <a:lstStyle/>
+            <a:p>
+              <a:pPr algn="l" rtl="0"/>
+              <a:r>
+                <a:rPr lang="en-US" sz="1200" dirty="0" smtClean="0"/>
+                <a:t>4</a:t>
+              </a:r>
+              <a:endParaRPr lang="en-US" sz="1600" dirty="0"/>
+            </a:p>
+          </p:txBody>
+        </p:sp>
+      </p:grpSp>
     </p:spTree>
   </p:cSld>
   <p:clrMapOvr>

</xml_diff>